<commit_message>
update simulation data and format figure
</commit_message>
<xml_diff>
--- a/test/plotFeasibleSet/plot.pptx
+++ b/test/plotFeasibleSet/plot.pptx
@@ -261,7 +261,7 @@
           <a:p>
             <a:fld id="{E4EAE48B-1E10-4947-9FAC-62FB4CFA0A3B}" type="datetimeFigureOut">
               <a:rPr lang="zh-CN" altLang="en-US" smtClean="0"/>
-              <a:t>2023/12/18</a:t>
+              <a:t>2024/5/7</a:t>
             </a:fld>
             <a:endParaRPr lang="zh-CN" altLang="en-US"/>
           </a:p>
@@ -461,7 +461,7 @@
           <a:p>
             <a:fld id="{E4EAE48B-1E10-4947-9FAC-62FB4CFA0A3B}" type="datetimeFigureOut">
               <a:rPr lang="zh-CN" altLang="en-US" smtClean="0"/>
-              <a:t>2023/12/18</a:t>
+              <a:t>2024/5/7</a:t>
             </a:fld>
             <a:endParaRPr lang="zh-CN" altLang="en-US"/>
           </a:p>
@@ -671,7 +671,7 @@
           <a:p>
             <a:fld id="{E4EAE48B-1E10-4947-9FAC-62FB4CFA0A3B}" type="datetimeFigureOut">
               <a:rPr lang="zh-CN" altLang="en-US" smtClean="0"/>
-              <a:t>2023/12/18</a:t>
+              <a:t>2024/5/7</a:t>
             </a:fld>
             <a:endParaRPr lang="zh-CN" altLang="en-US"/>
           </a:p>
@@ -871,7 +871,7 @@
           <a:p>
             <a:fld id="{E4EAE48B-1E10-4947-9FAC-62FB4CFA0A3B}" type="datetimeFigureOut">
               <a:rPr lang="zh-CN" altLang="en-US" smtClean="0"/>
-              <a:t>2023/12/18</a:t>
+              <a:t>2024/5/7</a:t>
             </a:fld>
             <a:endParaRPr lang="zh-CN" altLang="en-US"/>
           </a:p>
@@ -1147,7 +1147,7 @@
           <a:p>
             <a:fld id="{E4EAE48B-1E10-4947-9FAC-62FB4CFA0A3B}" type="datetimeFigureOut">
               <a:rPr lang="zh-CN" altLang="en-US" smtClean="0"/>
-              <a:t>2023/12/18</a:t>
+              <a:t>2024/5/7</a:t>
             </a:fld>
             <a:endParaRPr lang="zh-CN" altLang="en-US"/>
           </a:p>
@@ -1415,7 +1415,7 @@
           <a:p>
             <a:fld id="{E4EAE48B-1E10-4947-9FAC-62FB4CFA0A3B}" type="datetimeFigureOut">
               <a:rPr lang="zh-CN" altLang="en-US" smtClean="0"/>
-              <a:t>2023/12/18</a:t>
+              <a:t>2024/5/7</a:t>
             </a:fld>
             <a:endParaRPr lang="zh-CN" altLang="en-US"/>
           </a:p>
@@ -1830,7 +1830,7 @@
           <a:p>
             <a:fld id="{E4EAE48B-1E10-4947-9FAC-62FB4CFA0A3B}" type="datetimeFigureOut">
               <a:rPr lang="zh-CN" altLang="en-US" smtClean="0"/>
-              <a:t>2023/12/18</a:t>
+              <a:t>2024/5/7</a:t>
             </a:fld>
             <a:endParaRPr lang="zh-CN" altLang="en-US"/>
           </a:p>
@@ -1972,7 +1972,7 @@
           <a:p>
             <a:fld id="{E4EAE48B-1E10-4947-9FAC-62FB4CFA0A3B}" type="datetimeFigureOut">
               <a:rPr lang="zh-CN" altLang="en-US" smtClean="0"/>
-              <a:t>2023/12/18</a:t>
+              <a:t>2024/5/7</a:t>
             </a:fld>
             <a:endParaRPr lang="zh-CN" altLang="en-US"/>
           </a:p>
@@ -2085,7 +2085,7 @@
           <a:p>
             <a:fld id="{E4EAE48B-1E10-4947-9FAC-62FB4CFA0A3B}" type="datetimeFigureOut">
               <a:rPr lang="zh-CN" altLang="en-US" smtClean="0"/>
-              <a:t>2023/12/18</a:t>
+              <a:t>2024/5/7</a:t>
             </a:fld>
             <a:endParaRPr lang="zh-CN" altLang="en-US"/>
           </a:p>
@@ -2398,7 +2398,7 @@
           <a:p>
             <a:fld id="{E4EAE48B-1E10-4947-9FAC-62FB4CFA0A3B}" type="datetimeFigureOut">
               <a:rPr lang="zh-CN" altLang="en-US" smtClean="0"/>
-              <a:t>2023/12/18</a:t>
+              <a:t>2024/5/7</a:t>
             </a:fld>
             <a:endParaRPr lang="zh-CN" altLang="en-US"/>
           </a:p>
@@ -2687,7 +2687,7 @@
           <a:p>
             <a:fld id="{E4EAE48B-1E10-4947-9FAC-62FB4CFA0A3B}" type="datetimeFigureOut">
               <a:rPr lang="zh-CN" altLang="en-US" smtClean="0"/>
-              <a:t>2023/12/18</a:t>
+              <a:t>2024/5/7</a:t>
             </a:fld>
             <a:endParaRPr lang="zh-CN" altLang="en-US"/>
           </a:p>
@@ -2930,7 +2930,7 @@
           <a:p>
             <a:fld id="{E4EAE48B-1E10-4947-9FAC-62FB4CFA0A3B}" type="datetimeFigureOut">
               <a:rPr lang="zh-CN" altLang="en-US" smtClean="0"/>
-              <a:t>2023/12/18</a:t>
+              <a:t>2024/5/7</a:t>
             </a:fld>
             <a:endParaRPr lang="zh-CN" altLang="en-US"/>
           </a:p>
@@ -3349,10 +3349,10 @@
       </p:grpSpPr>
       <p:grpSp>
         <p:nvGrpSpPr>
-          <p:cNvPr id="18" name="Group 17">
-            <a:extLst>
-              <a:ext uri="{FF2B5EF4-FFF2-40B4-BE49-F238E27FC236}">
-                <a16:creationId xmlns:a16="http://schemas.microsoft.com/office/drawing/2014/main" id="{11CF6788-88E1-48AB-9A7A-6348DD08CB35}"/>
+          <p:cNvPr id="22" name="Group 21">
+            <a:extLst>
+              <a:ext uri="{FF2B5EF4-FFF2-40B4-BE49-F238E27FC236}">
+                <a16:creationId xmlns:a16="http://schemas.microsoft.com/office/drawing/2014/main" id="{704CD31E-E41D-41E8-B0E7-5E8514B6C048}"/>
               </a:ext>
             </a:extLst>
           </p:cNvPr>
@@ -3369,10 +3369,10 @@
         </p:grpSpPr>
         <p:pic>
           <p:nvPicPr>
-            <p:cNvPr id="5" name="Picture 4">
+            <p:cNvPr id="21" name="Picture 20">
               <a:extLst>
                 <a:ext uri="{FF2B5EF4-FFF2-40B4-BE49-F238E27FC236}">
-                  <a16:creationId xmlns:a16="http://schemas.microsoft.com/office/drawing/2014/main" id="{057FDDD6-B7E3-4023-A1A8-EA9A235B9BF0}"/>
+                  <a16:creationId xmlns:a16="http://schemas.microsoft.com/office/drawing/2014/main" id="{033F3A31-ED8E-4FB3-B837-31CF9B61AF68}"/>
                 </a:ext>
               </a:extLst>
             </p:cNvPr>
@@ -3403,1176 +3403,943 @@
             </a:prstGeom>
           </p:spPr>
         </p:pic>
-        <mc:AlternateContent xmlns:mc="http://schemas.openxmlformats.org/markup-compatibility/2006">
-          <mc:Choice xmlns:a14="http://schemas.microsoft.com/office/drawing/2010/main" Requires="a14">
-            <p:sp>
-              <p:nvSpPr>
-                <p:cNvPr id="6" name="TextBox 5">
-                  <a:extLst>
-                    <a:ext uri="{FF2B5EF4-FFF2-40B4-BE49-F238E27FC236}">
-                      <a16:creationId xmlns:a16="http://schemas.microsoft.com/office/drawing/2014/main" id="{CF348DF5-1F69-4B57-97D6-C07715D40AF2}"/>
-                    </a:ext>
-                  </a:extLst>
-                </p:cNvPr>
-                <p:cNvSpPr txBox="1"/>
-                <p:nvPr/>
-              </p:nvSpPr>
-              <p:spPr>
-                <a:xfrm>
-                  <a:off x="6018216" y="6370655"/>
-                  <a:ext cx="538865" cy="385555"/>
-                </a:xfrm>
-                <a:prstGeom prst="rect">
-                  <a:avLst/>
-                </a:prstGeom>
-                <a:noFill/>
-              </p:spPr>
-              <p:txBody>
-                <a:bodyPr wrap="none" lIns="0" tIns="0" rIns="0" bIns="0" rtlCol="0">
-                  <a:spAutoFit/>
-                </a:bodyPr>
-                <a:lstStyle/>
-                <a:p>
-                  <a:pPr/>
-                  <a14:m>
-                    <m:oMathPara xmlns:m="http://schemas.openxmlformats.org/officeDocument/2006/math">
-                      <m:oMathParaPr>
-                        <m:jc m:val="centerGroup"/>
-                      </m:oMathParaPr>
-                      <m:oMath xmlns:m="http://schemas.openxmlformats.org/officeDocument/2006/math">
-                        <m:sSub>
-                          <m:sSubPr>
-                            <m:ctrlPr>
-                              <a:rPr lang="en-US" altLang="zh-CN" sz="2400" b="0" i="1" smtClean="0">
-                                <a:latin typeface="Cambria Math" panose="02040503050406030204" pitchFamily="18" charset="0"/>
-                              </a:rPr>
-                            </m:ctrlPr>
-                          </m:sSubPr>
-                          <m:e>
-                            <m:r>
-                              <a:rPr lang="en-US" altLang="zh-CN" sz="2400" b="0" i="1" smtClean="0">
-                                <a:latin typeface="Cambria Math" panose="02040503050406030204" pitchFamily="18" charset="0"/>
-                              </a:rPr>
-                              <m:t>𝜆</m:t>
-                            </m:r>
-                          </m:e>
-                          <m:sub>
-                            <m:r>
-                              <a:rPr lang="en-US" altLang="zh-CN" sz="2400" b="0" i="1" smtClean="0">
-                                <a:latin typeface="Cambria Math" panose="02040503050406030204" pitchFamily="18" charset="0"/>
-                              </a:rPr>
-                              <m:t>𝑛</m:t>
-                            </m:r>
-                            <m:r>
-                              <a:rPr lang="en-US" altLang="zh-CN" sz="2400" b="0" i="1" smtClean="0">
-                                <a:latin typeface="Cambria Math" panose="02040503050406030204" pitchFamily="18" charset="0"/>
-                              </a:rPr>
-                              <m:t>,</m:t>
-                            </m:r>
-                            <m:r>
-                              <a:rPr lang="en-US" altLang="zh-CN" sz="2400" b="0" i="1" smtClean="0">
-                                <a:latin typeface="Cambria Math" panose="02040503050406030204" pitchFamily="18" charset="0"/>
-                              </a:rPr>
-                              <m:t>𝑖</m:t>
-                            </m:r>
-                          </m:sub>
-                        </m:sSub>
-                      </m:oMath>
-                    </m:oMathPara>
-                  </a14:m>
-                  <a:endParaRPr lang="zh-CN" altLang="en-US" sz="2400" dirty="0"/>
-                </a:p>
-              </p:txBody>
-            </p:sp>
-          </mc:Choice>
-          <mc:Fallback>
-            <p:sp>
-              <p:nvSpPr>
-                <p:cNvPr id="6" name="TextBox 5">
-                  <a:extLst>
-                    <a:ext uri="{FF2B5EF4-FFF2-40B4-BE49-F238E27FC236}">
-                      <a16:creationId xmlns:a16="http://schemas.microsoft.com/office/drawing/2014/main" id="{CF348DF5-1F69-4B57-97D6-C07715D40AF2}"/>
-                    </a:ext>
-                  </a:extLst>
-                </p:cNvPr>
-                <p:cNvSpPr txBox="1">
-                  <a:spLocks noRot="1" noChangeAspect="1" noMove="1" noResize="1" noEditPoints="1" noAdjustHandles="1" noChangeArrowheads="1" noChangeShapeType="1" noTextEdit="1"/>
-                </p:cNvSpPr>
-                <p:nvPr/>
-              </p:nvSpPr>
-              <p:spPr>
-                <a:xfrm>
-                  <a:off x="6018216" y="6370655"/>
-                  <a:ext cx="538865" cy="385555"/>
-                </a:xfrm>
-                <a:prstGeom prst="rect">
-                  <a:avLst/>
-                </a:prstGeom>
-                <a:blipFill>
-                  <a:blip r:embed="rId3"/>
-                  <a:stretch>
-                    <a:fillRect l="-12360" r="-2247" b="-12698"/>
-                  </a:stretch>
-                </a:blipFill>
-              </p:spPr>
-              <p:txBody>
-                <a:bodyPr/>
-                <a:lstStyle/>
-                <a:p>
-                  <a:r>
-                    <a:rPr lang="zh-CN" altLang="en-US">
-                      <a:noFill/>
-                    </a:rPr>
-                    <a:t> </a:t>
-                  </a:r>
-                </a:p>
-              </p:txBody>
-            </p:sp>
-          </mc:Fallback>
-        </mc:AlternateContent>
-        <mc:AlternateContent xmlns:mc="http://schemas.openxmlformats.org/markup-compatibility/2006">
-          <mc:Choice xmlns:a14="http://schemas.microsoft.com/office/drawing/2010/main" Requires="a14">
-            <p:sp>
-              <p:nvSpPr>
-                <p:cNvPr id="7" name="TextBox 6">
-                  <a:extLst>
-                    <a:ext uri="{FF2B5EF4-FFF2-40B4-BE49-F238E27FC236}">
-                      <a16:creationId xmlns:a16="http://schemas.microsoft.com/office/drawing/2014/main" id="{11A52E8C-5D3D-4CD5-BCF4-EDA98AF6CE31}"/>
-                    </a:ext>
-                  </a:extLst>
-                </p:cNvPr>
-                <p:cNvSpPr txBox="1"/>
-                <p:nvPr/>
-              </p:nvSpPr>
-              <p:spPr>
-                <a:xfrm>
-                  <a:off x="1860570" y="3043445"/>
-                  <a:ext cx="542071" cy="385555"/>
-                </a:xfrm>
-                <a:prstGeom prst="rect">
-                  <a:avLst/>
-                </a:prstGeom>
-                <a:noFill/>
-              </p:spPr>
-              <p:txBody>
-                <a:bodyPr wrap="none" lIns="0" tIns="0" rIns="0" bIns="0" rtlCol="0">
-                  <a:spAutoFit/>
-                </a:bodyPr>
-                <a:lstStyle/>
-                <a:p>
-                  <a:pPr/>
-                  <a14:m>
-                    <m:oMathPara xmlns:m="http://schemas.openxmlformats.org/officeDocument/2006/math">
-                      <m:oMathParaPr>
-                        <m:jc m:val="centerGroup"/>
-                      </m:oMathParaPr>
-                      <m:oMath xmlns:m="http://schemas.openxmlformats.org/officeDocument/2006/math">
-                        <m:sSub>
-                          <m:sSubPr>
-                            <m:ctrlPr>
-                              <a:rPr lang="en-US" altLang="zh-CN" sz="2400" b="0" i="1" smtClean="0">
-                                <a:latin typeface="Cambria Math" panose="02040503050406030204" pitchFamily="18" charset="0"/>
-                              </a:rPr>
-                            </m:ctrlPr>
-                          </m:sSubPr>
-                          <m:e>
-                            <m:r>
-                              <a:rPr lang="en-US" altLang="zh-CN" sz="2400" b="0" i="1" smtClean="0">
-                                <a:latin typeface="Cambria Math" panose="02040503050406030204" pitchFamily="18" charset="0"/>
-                              </a:rPr>
-                              <m:t>𝜂</m:t>
-                            </m:r>
-                          </m:e>
-                          <m:sub>
-                            <m:r>
-                              <a:rPr lang="en-US" altLang="zh-CN" sz="2400" b="0" i="1" smtClean="0">
-                                <a:latin typeface="Cambria Math" panose="02040503050406030204" pitchFamily="18" charset="0"/>
-                              </a:rPr>
-                              <m:t>𝑛</m:t>
-                            </m:r>
-                            <m:r>
-                              <a:rPr lang="en-US" altLang="zh-CN" sz="2400" b="0" i="1" smtClean="0">
-                                <a:latin typeface="Cambria Math" panose="02040503050406030204" pitchFamily="18" charset="0"/>
-                              </a:rPr>
-                              <m:t>,</m:t>
-                            </m:r>
-                            <m:r>
-                              <a:rPr lang="en-US" altLang="zh-CN" sz="2400" b="0" i="1" smtClean="0">
-                                <a:latin typeface="Cambria Math" panose="02040503050406030204" pitchFamily="18" charset="0"/>
-                              </a:rPr>
-                              <m:t>𝑖</m:t>
-                            </m:r>
-                          </m:sub>
-                        </m:sSub>
-                      </m:oMath>
-                    </m:oMathPara>
-                  </a14:m>
-                  <a:endParaRPr lang="zh-CN" altLang="en-US" sz="2400" dirty="0"/>
-                </a:p>
-              </p:txBody>
-            </p:sp>
-          </mc:Choice>
-          <mc:Fallback>
-            <p:sp>
-              <p:nvSpPr>
-                <p:cNvPr id="7" name="TextBox 6">
-                  <a:extLst>
-                    <a:ext uri="{FF2B5EF4-FFF2-40B4-BE49-F238E27FC236}">
-                      <a16:creationId xmlns:a16="http://schemas.microsoft.com/office/drawing/2014/main" id="{11A52E8C-5D3D-4CD5-BCF4-EDA98AF6CE31}"/>
-                    </a:ext>
-                  </a:extLst>
-                </p:cNvPr>
-                <p:cNvSpPr txBox="1">
-                  <a:spLocks noRot="1" noChangeAspect="1" noMove="1" noResize="1" noEditPoints="1" noAdjustHandles="1" noChangeArrowheads="1" noChangeShapeType="1" noTextEdit="1"/>
-                </p:cNvSpPr>
-                <p:nvPr/>
-              </p:nvSpPr>
-              <p:spPr>
-                <a:xfrm>
-                  <a:off x="1860570" y="3043445"/>
-                  <a:ext cx="542071" cy="385555"/>
-                </a:xfrm>
-                <a:prstGeom prst="rect">
-                  <a:avLst/>
-                </a:prstGeom>
-                <a:blipFill>
-                  <a:blip r:embed="rId4"/>
-                  <a:stretch>
-                    <a:fillRect l="-12360" r="-3371" b="-20313"/>
-                  </a:stretch>
-                </a:blipFill>
-              </p:spPr>
-              <p:txBody>
-                <a:bodyPr/>
-                <a:lstStyle/>
-                <a:p>
-                  <a:r>
-                    <a:rPr lang="zh-CN" altLang="en-US">
-                      <a:noFill/>
-                    </a:rPr>
-                    <a:t> </a:t>
-                  </a:r>
-                </a:p>
-              </p:txBody>
-            </p:sp>
-          </mc:Fallback>
-        </mc:AlternateContent>
-        <mc:AlternateContent xmlns:mc="http://schemas.openxmlformats.org/markup-compatibility/2006">
-          <mc:Choice xmlns:a14="http://schemas.microsoft.com/office/drawing/2010/main" Requires="a14">
-            <p:sp>
-              <p:nvSpPr>
-                <p:cNvPr id="8" name="TextBox 7">
-                  <a:extLst>
-                    <a:ext uri="{FF2B5EF4-FFF2-40B4-BE49-F238E27FC236}">
-                      <a16:creationId xmlns:a16="http://schemas.microsoft.com/office/drawing/2014/main" id="{A2581CEA-52DF-4FA3-AC0B-8E3E8AC7E98D}"/>
-                    </a:ext>
-                  </a:extLst>
-                </p:cNvPr>
-                <p:cNvSpPr txBox="1"/>
-                <p:nvPr/>
-              </p:nvSpPr>
-              <p:spPr>
-                <a:xfrm>
-                  <a:off x="2999139" y="3561177"/>
-                  <a:ext cx="1195007" cy="385555"/>
-                </a:xfrm>
-                <a:prstGeom prst="rect">
-                  <a:avLst/>
-                </a:prstGeom>
-                <a:noFill/>
-              </p:spPr>
-              <p:txBody>
-                <a:bodyPr wrap="none" lIns="0" tIns="0" rIns="0" bIns="0" rtlCol="0">
-                  <a:spAutoFit/>
-                </a:bodyPr>
-                <a:lstStyle/>
-                <a:p>
-                  <a:pPr/>
-                  <a14:m>
-                    <m:oMathPara xmlns:m="http://schemas.openxmlformats.org/officeDocument/2006/math">
-                      <m:oMathParaPr>
-                        <m:jc m:val="centerGroup"/>
-                      </m:oMathParaPr>
-                      <m:oMath xmlns:m="http://schemas.openxmlformats.org/officeDocument/2006/math">
-                        <m:sSub>
-                          <m:sSubPr>
-                            <m:ctrlPr>
-                              <a:rPr lang="en-US" altLang="zh-CN" sz="2400" b="0" i="1" smtClean="0">
-                                <a:latin typeface="Cambria Math" panose="02040503050406030204" pitchFamily="18" charset="0"/>
-                              </a:rPr>
-                            </m:ctrlPr>
-                          </m:sSubPr>
-                          <m:e>
-                            <m:r>
-                              <a:rPr lang="en-US" altLang="zh-CN" sz="2400" b="0" i="1" smtClean="0">
-                                <a:latin typeface="Cambria Math" panose="02040503050406030204" pitchFamily="18" charset="0"/>
-                              </a:rPr>
-                              <m:t>𝜆</m:t>
-                            </m:r>
-                          </m:e>
-                          <m:sub>
-                            <m:r>
-                              <a:rPr lang="en-US" altLang="zh-CN" sz="2400" b="0" i="1" smtClean="0">
-                                <a:latin typeface="Cambria Math" panose="02040503050406030204" pitchFamily="18" charset="0"/>
-                              </a:rPr>
-                              <m:t>𝑛</m:t>
-                            </m:r>
-                            <m:r>
-                              <a:rPr lang="en-US" altLang="zh-CN" sz="2400" b="0" i="1" smtClean="0">
-                                <a:latin typeface="Cambria Math" panose="02040503050406030204" pitchFamily="18" charset="0"/>
-                              </a:rPr>
-                              <m:t>,</m:t>
-                            </m:r>
-                            <m:r>
-                              <a:rPr lang="en-US" altLang="zh-CN" sz="2400" b="0" i="1" smtClean="0">
-                                <a:latin typeface="Cambria Math" panose="02040503050406030204" pitchFamily="18" charset="0"/>
-                              </a:rPr>
-                              <m:t>𝑖</m:t>
-                            </m:r>
-                          </m:sub>
-                        </m:sSub>
-                        <m:r>
-                          <a:rPr lang="en-US" altLang="zh-CN" sz="2400" b="0" i="1" smtClean="0">
-                            <a:latin typeface="Cambria Math" panose="02040503050406030204" pitchFamily="18" charset="0"/>
-                          </a:rPr>
-                          <m:t>=</m:t>
-                        </m:r>
-                        <m:sSub>
-                          <m:sSubPr>
-                            <m:ctrlPr>
-                              <a:rPr lang="en-US" altLang="zh-CN" sz="2400" b="0" i="1" smtClean="0">
-                                <a:latin typeface="Cambria Math" panose="02040503050406030204" pitchFamily="18" charset="0"/>
-                              </a:rPr>
-                            </m:ctrlPr>
-                          </m:sSubPr>
-                          <m:e>
-                            <m:r>
-                              <a:rPr lang="en-US" altLang="zh-CN" sz="2400" b="0" i="1" smtClean="0">
-                                <a:latin typeface="Cambria Math" panose="02040503050406030204" pitchFamily="18" charset="0"/>
-                              </a:rPr>
-                              <m:t>𝑏</m:t>
-                            </m:r>
-                          </m:e>
-                          <m:sub>
-                            <m:r>
-                              <a:rPr lang="en-US" altLang="zh-CN" sz="2400" b="0" i="1" smtClean="0">
-                                <a:latin typeface="Cambria Math" panose="02040503050406030204" pitchFamily="18" charset="0"/>
-                              </a:rPr>
-                              <m:t>𝑙</m:t>
-                            </m:r>
-                          </m:sub>
-                        </m:sSub>
-                      </m:oMath>
-                    </m:oMathPara>
-                  </a14:m>
-                  <a:endParaRPr lang="zh-CN" altLang="en-US" sz="2400" dirty="0"/>
-                </a:p>
-              </p:txBody>
-            </p:sp>
-          </mc:Choice>
-          <mc:Fallback>
-            <p:sp>
-              <p:nvSpPr>
-                <p:cNvPr id="8" name="TextBox 7">
-                  <a:extLst>
-                    <a:ext uri="{FF2B5EF4-FFF2-40B4-BE49-F238E27FC236}">
-                      <a16:creationId xmlns:a16="http://schemas.microsoft.com/office/drawing/2014/main" id="{A2581CEA-52DF-4FA3-AC0B-8E3E8AC7E98D}"/>
-                    </a:ext>
-                  </a:extLst>
-                </p:cNvPr>
-                <p:cNvSpPr txBox="1">
-                  <a:spLocks noRot="1" noChangeAspect="1" noMove="1" noResize="1" noEditPoints="1" noAdjustHandles="1" noChangeArrowheads="1" noChangeShapeType="1" noTextEdit="1"/>
-                </p:cNvSpPr>
-                <p:nvPr/>
-              </p:nvSpPr>
-              <p:spPr>
-                <a:xfrm>
-                  <a:off x="2999139" y="3561177"/>
-                  <a:ext cx="1195007" cy="385555"/>
-                </a:xfrm>
-                <a:prstGeom prst="rect">
-                  <a:avLst/>
-                </a:prstGeom>
-                <a:blipFill>
-                  <a:blip r:embed="rId5"/>
-                  <a:stretch>
-                    <a:fillRect l="-5102" r="-1020" b="-12698"/>
-                  </a:stretch>
-                </a:blipFill>
-              </p:spPr>
-              <p:txBody>
-                <a:bodyPr/>
-                <a:lstStyle/>
-                <a:p>
-                  <a:r>
-                    <a:rPr lang="zh-CN" altLang="en-US">
-                      <a:noFill/>
-                    </a:rPr>
-                    <a:t> </a:t>
-                  </a:r>
-                </a:p>
-              </p:txBody>
-            </p:sp>
-          </mc:Fallback>
-        </mc:AlternateContent>
-        <p:cxnSp>
-          <p:nvCxnSpPr>
-            <p:cNvPr id="9" name="Straight Arrow Connector 8">
+        <p:grpSp>
+          <p:nvGrpSpPr>
+            <p:cNvPr id="18" name="Group 17">
               <a:extLst>
                 <a:ext uri="{FF2B5EF4-FFF2-40B4-BE49-F238E27FC236}">
-                  <a16:creationId xmlns:a16="http://schemas.microsoft.com/office/drawing/2014/main" id="{390CF0F9-08F0-47D4-A046-19F6F292B61A}"/>
+                  <a16:creationId xmlns:a16="http://schemas.microsoft.com/office/drawing/2014/main" id="{11CF6788-88E1-48AB-9A7A-6348DD08CB35}"/>
                 </a:ext>
               </a:extLst>
             </p:cNvPr>
-            <p:cNvCxnSpPr>
-              <a:cxnSpLocks/>
-            </p:cNvCxnSpPr>
+            <p:cNvGrpSpPr/>
             <p:nvPr/>
-          </p:nvCxnSpPr>
-          <p:spPr>
-            <a:xfrm flipV="1">
-              <a:off x="3281283" y="3003845"/>
-              <a:ext cx="340768" cy="557332"/>
+          </p:nvGrpSpPr>
+          <p:grpSpPr>
+            <a:xfrm>
+              <a:off x="2913976" y="1694134"/>
+              <a:ext cx="7511221" cy="3302450"/>
+              <a:chOff x="2913976" y="1694134"/>
+              <a:chExt cx="7511221" cy="3302450"/>
             </a:xfrm>
-            <a:prstGeom prst="straightConnector1">
-              <a:avLst/>
-            </a:prstGeom>
-            <a:ln>
-              <a:tailEnd type="triangle"/>
-            </a:ln>
-          </p:spPr>
-          <p:style>
-            <a:lnRef idx="1">
-              <a:schemeClr val="dk1"/>
-            </a:lnRef>
-            <a:fillRef idx="0">
-              <a:schemeClr val="dk1"/>
-            </a:fillRef>
-            <a:effectRef idx="0">
-              <a:schemeClr val="dk1"/>
-            </a:effectRef>
-            <a:fontRef idx="minor">
-              <a:schemeClr val="tx1"/>
-            </a:fontRef>
-          </p:style>
-        </p:cxnSp>
-        <mc:AlternateContent xmlns:mc="http://schemas.openxmlformats.org/markup-compatibility/2006">
-          <mc:Choice xmlns:a14="http://schemas.microsoft.com/office/drawing/2010/main" Requires="a14">
-            <p:sp>
-              <p:nvSpPr>
-                <p:cNvPr id="10" name="TextBox 9">
-                  <a:extLst>
-                    <a:ext uri="{FF2B5EF4-FFF2-40B4-BE49-F238E27FC236}">
-                      <a16:creationId xmlns:a16="http://schemas.microsoft.com/office/drawing/2014/main" id="{B90BEB51-ECC4-48E3-AD2C-FE0B6AAF912F}"/>
-                    </a:ext>
-                  </a:extLst>
-                </p:cNvPr>
-                <p:cNvSpPr txBox="1"/>
-                <p:nvPr/>
-              </p:nvSpPr>
-              <p:spPr>
-                <a:xfrm>
-                  <a:off x="9166711" y="4358546"/>
-                  <a:ext cx="1258485" cy="385555"/>
-                </a:xfrm>
-                <a:prstGeom prst="rect">
-                  <a:avLst/>
-                </a:prstGeom>
-                <a:noFill/>
-              </p:spPr>
-              <p:txBody>
-                <a:bodyPr wrap="none" lIns="0" tIns="0" rIns="0" bIns="0" rtlCol="0">
-                  <a:spAutoFit/>
-                </a:bodyPr>
-                <a:lstStyle/>
-                <a:p>
-                  <a:pPr/>
-                  <a14:m>
-                    <m:oMathPara xmlns:m="http://schemas.openxmlformats.org/officeDocument/2006/math">
-                      <m:oMathParaPr>
-                        <m:jc m:val="centerGroup"/>
-                      </m:oMathParaPr>
-                      <m:oMath xmlns:m="http://schemas.openxmlformats.org/officeDocument/2006/math">
-                        <m:sSub>
-                          <m:sSubPr>
-                            <m:ctrlPr>
-                              <a:rPr lang="en-US" altLang="zh-CN" sz="2400" b="0" i="1" smtClean="0">
-                                <a:latin typeface="Cambria Math" panose="02040503050406030204" pitchFamily="18" charset="0"/>
-                              </a:rPr>
-                            </m:ctrlPr>
-                          </m:sSubPr>
-                          <m:e>
-                            <m:r>
-                              <a:rPr lang="en-US" altLang="zh-CN" sz="2400" b="0" i="1" smtClean="0">
-                                <a:latin typeface="Cambria Math" panose="02040503050406030204" pitchFamily="18" charset="0"/>
-                              </a:rPr>
-                              <m:t>𝜆</m:t>
-                            </m:r>
-                          </m:e>
-                          <m:sub>
-                            <m:r>
-                              <a:rPr lang="en-US" altLang="zh-CN" sz="2400" b="0" i="1" smtClean="0">
-                                <a:latin typeface="Cambria Math" panose="02040503050406030204" pitchFamily="18" charset="0"/>
-                              </a:rPr>
-                              <m:t>𝑛</m:t>
-                            </m:r>
-                            <m:r>
-                              <a:rPr lang="en-US" altLang="zh-CN" sz="2400" b="0" i="1" smtClean="0">
-                                <a:latin typeface="Cambria Math" panose="02040503050406030204" pitchFamily="18" charset="0"/>
-                              </a:rPr>
-                              <m:t>,</m:t>
-                            </m:r>
-                            <m:r>
-                              <a:rPr lang="en-US" altLang="zh-CN" sz="2400" b="0" i="1" smtClean="0">
-                                <a:latin typeface="Cambria Math" panose="02040503050406030204" pitchFamily="18" charset="0"/>
-                              </a:rPr>
-                              <m:t>𝑖</m:t>
-                            </m:r>
-                          </m:sub>
-                        </m:sSub>
-                        <m:r>
-                          <a:rPr lang="en-US" altLang="zh-CN" sz="2400" b="0" i="1" smtClean="0">
-                            <a:latin typeface="Cambria Math" panose="02040503050406030204" pitchFamily="18" charset="0"/>
-                          </a:rPr>
-                          <m:t>=</m:t>
-                        </m:r>
-                        <m:sSub>
-                          <m:sSubPr>
-                            <m:ctrlPr>
-                              <a:rPr lang="en-US" altLang="zh-CN" sz="2400" b="0" i="1" smtClean="0">
-                                <a:latin typeface="Cambria Math" panose="02040503050406030204" pitchFamily="18" charset="0"/>
-                              </a:rPr>
-                            </m:ctrlPr>
-                          </m:sSubPr>
-                          <m:e>
-                            <m:r>
-                              <a:rPr lang="en-US" altLang="zh-CN" sz="2400" b="0" i="1" smtClean="0">
-                                <a:latin typeface="Cambria Math" panose="02040503050406030204" pitchFamily="18" charset="0"/>
-                              </a:rPr>
-                              <m:t>𝑏</m:t>
-                            </m:r>
-                          </m:e>
-                          <m:sub>
-                            <m:r>
-                              <a:rPr lang="en-US" altLang="zh-CN" sz="2400" b="0" i="1" smtClean="0">
-                                <a:latin typeface="Cambria Math" panose="02040503050406030204" pitchFamily="18" charset="0"/>
-                              </a:rPr>
-                              <m:t>𝑢</m:t>
-                            </m:r>
-                          </m:sub>
-                        </m:sSub>
-                      </m:oMath>
-                    </m:oMathPara>
-                  </a14:m>
-                  <a:endParaRPr lang="zh-CN" altLang="en-US" sz="2400" dirty="0"/>
-                </a:p>
-              </p:txBody>
-            </p:sp>
-          </mc:Choice>
-          <mc:Fallback>
-            <p:sp>
-              <p:nvSpPr>
-                <p:cNvPr id="10" name="TextBox 9">
-                  <a:extLst>
-                    <a:ext uri="{FF2B5EF4-FFF2-40B4-BE49-F238E27FC236}">
-                      <a16:creationId xmlns:a16="http://schemas.microsoft.com/office/drawing/2014/main" id="{B90BEB51-ECC4-48E3-AD2C-FE0B6AAF912F}"/>
-                    </a:ext>
-                  </a:extLst>
-                </p:cNvPr>
-                <p:cNvSpPr txBox="1">
-                  <a:spLocks noRot="1" noChangeAspect="1" noMove="1" noResize="1" noEditPoints="1" noAdjustHandles="1" noChangeArrowheads="1" noChangeShapeType="1" noTextEdit="1"/>
-                </p:cNvSpPr>
-                <p:nvPr/>
-              </p:nvSpPr>
-              <p:spPr>
-                <a:xfrm>
-                  <a:off x="9166711" y="4358546"/>
-                  <a:ext cx="1258485" cy="385555"/>
-                </a:xfrm>
-                <a:prstGeom prst="rect">
-                  <a:avLst/>
-                </a:prstGeom>
-                <a:blipFill>
-                  <a:blip r:embed="rId6"/>
-                  <a:stretch>
-                    <a:fillRect l="-4854" b="-12698"/>
-                  </a:stretch>
-                </a:blipFill>
-              </p:spPr>
-              <p:txBody>
-                <a:bodyPr/>
-                <a:lstStyle/>
-                <a:p>
-                  <a:r>
-                    <a:rPr lang="zh-CN" altLang="en-US">
-                      <a:noFill/>
-                    </a:rPr>
-                    <a:t> </a:t>
-                  </a:r>
-                </a:p>
-              </p:txBody>
-            </p:sp>
-          </mc:Fallback>
-        </mc:AlternateContent>
-        <p:cxnSp>
-          <p:nvCxnSpPr>
-            <p:cNvPr id="11" name="Straight Arrow Connector 10">
-              <a:extLst>
-                <a:ext uri="{FF2B5EF4-FFF2-40B4-BE49-F238E27FC236}">
-                  <a16:creationId xmlns:a16="http://schemas.microsoft.com/office/drawing/2014/main" id="{32DAB4DB-B337-4630-8977-46E82CC6A972}"/>
-                </a:ext>
-              </a:extLst>
-            </p:cNvPr>
-            <p:cNvCxnSpPr>
-              <a:cxnSpLocks/>
-            </p:cNvCxnSpPr>
-            <p:nvPr/>
-          </p:nvCxnSpPr>
-          <p:spPr>
-            <a:xfrm flipH="1">
-              <a:off x="8841531" y="4551324"/>
-              <a:ext cx="293346" cy="0"/>
-            </a:xfrm>
-            <a:prstGeom prst="straightConnector1">
-              <a:avLst/>
-            </a:prstGeom>
-            <a:ln>
-              <a:tailEnd type="triangle"/>
-            </a:ln>
-          </p:spPr>
-          <p:style>
-            <a:lnRef idx="1">
-              <a:schemeClr val="dk1"/>
-            </a:lnRef>
-            <a:fillRef idx="0">
-              <a:schemeClr val="dk1"/>
-            </a:fillRef>
-            <a:effectRef idx="0">
-              <a:schemeClr val="dk1"/>
-            </a:effectRef>
-            <a:fontRef idx="minor">
-              <a:schemeClr val="tx1"/>
-            </a:fontRef>
-          </p:style>
-        </p:cxnSp>
-        <p:cxnSp>
-          <p:nvCxnSpPr>
-            <p:cNvPr id="14" name="Straight Arrow Connector 13">
-              <a:extLst>
-                <a:ext uri="{FF2B5EF4-FFF2-40B4-BE49-F238E27FC236}">
-                  <a16:creationId xmlns:a16="http://schemas.microsoft.com/office/drawing/2014/main" id="{5D10C65A-9DD5-4ACF-8752-79581598CFD8}"/>
-                </a:ext>
-              </a:extLst>
-            </p:cNvPr>
-            <p:cNvCxnSpPr>
-              <a:cxnSpLocks/>
-            </p:cNvCxnSpPr>
-            <p:nvPr/>
-          </p:nvCxnSpPr>
-          <p:spPr>
-            <a:xfrm flipH="1">
-              <a:off x="4108339" y="1989965"/>
-              <a:ext cx="504301" cy="737999"/>
-            </a:xfrm>
-            <a:prstGeom prst="straightConnector1">
-              <a:avLst/>
-            </a:prstGeom>
-            <a:ln>
-              <a:tailEnd type="triangle"/>
-            </a:ln>
-          </p:spPr>
-          <p:style>
-            <a:lnRef idx="1">
-              <a:schemeClr val="dk1"/>
-            </a:lnRef>
-            <a:fillRef idx="0">
-              <a:schemeClr val="dk1"/>
-            </a:fillRef>
-            <a:effectRef idx="0">
-              <a:schemeClr val="dk1"/>
-            </a:effectRef>
-            <a:fontRef idx="minor">
-              <a:schemeClr val="tx1"/>
-            </a:fontRef>
-          </p:style>
-        </p:cxnSp>
-        <mc:AlternateContent xmlns:mc="http://schemas.openxmlformats.org/markup-compatibility/2006">
-          <mc:Choice xmlns:a14="http://schemas.microsoft.com/office/drawing/2010/main" Requires="a14">
-            <p:sp>
-              <p:nvSpPr>
-                <p:cNvPr id="15" name="TextBox 14">
-                  <a:extLst>
-                    <a:ext uri="{FF2B5EF4-FFF2-40B4-BE49-F238E27FC236}">
-                      <a16:creationId xmlns:a16="http://schemas.microsoft.com/office/drawing/2014/main" id="{1F5BE5D0-CE11-4DB7-93AC-13DB06C6159D}"/>
-                    </a:ext>
-                  </a:extLst>
-                </p:cNvPr>
-                <p:cNvSpPr txBox="1"/>
-                <p:nvPr/>
-              </p:nvSpPr>
-              <p:spPr>
-                <a:xfrm>
-                  <a:off x="3844030" y="1504151"/>
-                  <a:ext cx="2443618" cy="416845"/>
-                </a:xfrm>
-                <a:prstGeom prst="rect">
-                  <a:avLst/>
-                </a:prstGeom>
-                <a:noFill/>
-              </p:spPr>
-              <p:txBody>
-                <a:bodyPr wrap="none" lIns="0" tIns="0" rIns="0" bIns="0" rtlCol="0">
-                  <a:spAutoFit/>
-                </a:bodyPr>
-                <a:lstStyle/>
-                <a:p>
-                  <a:pPr/>
-                  <a14:m>
-                    <m:oMathPara xmlns:m="http://schemas.openxmlformats.org/officeDocument/2006/math">
-                      <m:oMathParaPr>
-                        <m:jc m:val="centerGroup"/>
-                      </m:oMathParaPr>
-                      <m:oMath xmlns:m="http://schemas.openxmlformats.org/officeDocument/2006/math">
-                        <m:d>
-                          <m:dPr>
-                            <m:ctrlPr>
-                              <a:rPr lang="en-US" altLang="zh-CN" sz="2400" b="0" i="1" smtClean="0">
-                                <a:latin typeface="Cambria Math" panose="02040503050406030204" pitchFamily="18" charset="0"/>
-                              </a:rPr>
-                            </m:ctrlPr>
-                          </m:dPr>
-                          <m:e>
-                            <m:sSub>
-                              <m:sSubPr>
-                                <m:ctrlPr>
-                                  <a:rPr lang="en-US" altLang="zh-CN" sz="2400" b="0" i="1" smtClean="0">
-                                    <a:latin typeface="Cambria Math" panose="02040503050406030204" pitchFamily="18" charset="0"/>
-                                  </a:rPr>
-                                </m:ctrlPr>
-                              </m:sSubPr>
-                              <m:e>
-                                <m:r>
-                                  <a:rPr lang="en-US" altLang="zh-CN" sz="2400" b="0" i="1" smtClean="0">
-                                    <a:latin typeface="Cambria Math" panose="02040503050406030204" pitchFamily="18" charset="0"/>
-                                  </a:rPr>
-                                  <m:t>𝜆</m:t>
-                                </m:r>
-                              </m:e>
-                              <m:sub>
-                                <m:r>
-                                  <a:rPr lang="en-US" altLang="zh-CN" sz="2400" b="0" i="1" smtClean="0">
-                                    <a:latin typeface="Cambria Math" panose="02040503050406030204" pitchFamily="18" charset="0"/>
-                                  </a:rPr>
-                                  <m:t>𝑛</m:t>
-                                </m:r>
-                                <m:r>
-                                  <a:rPr lang="en-US" altLang="zh-CN" sz="2400" b="0" i="1" smtClean="0">
-                                    <a:latin typeface="Cambria Math" panose="02040503050406030204" pitchFamily="18" charset="0"/>
-                                  </a:rPr>
-                                  <m:t>,</m:t>
-                                </m:r>
-                                <m:r>
-                                  <a:rPr lang="en-US" altLang="zh-CN" sz="2400" b="0" i="1" smtClean="0">
-                                    <a:latin typeface="Cambria Math" panose="02040503050406030204" pitchFamily="18" charset="0"/>
-                                  </a:rPr>
-                                  <m:t>𝑖</m:t>
-                                </m:r>
-                              </m:sub>
-                            </m:sSub>
-                            <m:r>
-                              <a:rPr lang="en-US" altLang="zh-CN" sz="2400" b="0" i="1" smtClean="0">
-                                <a:latin typeface="Cambria Math" panose="02040503050406030204" pitchFamily="18" charset="0"/>
-                              </a:rPr>
-                              <m:t>−</m:t>
-                            </m:r>
-                            <m:sSub>
-                              <m:sSubPr>
-                                <m:ctrlPr>
-                                  <a:rPr lang="en-US" altLang="zh-CN" sz="2400" b="0" i="1" smtClean="0">
-                                    <a:latin typeface="Cambria Math" panose="02040503050406030204" pitchFamily="18" charset="0"/>
-                                  </a:rPr>
-                                </m:ctrlPr>
-                              </m:sSubPr>
-                              <m:e>
-                                <m:r>
-                                  <a:rPr lang="en-US" altLang="zh-CN" sz="2400" b="0" i="1" smtClean="0">
-                                    <a:latin typeface="Cambria Math" panose="02040503050406030204" pitchFamily="18" charset="0"/>
-                                  </a:rPr>
-                                  <m:t>𝑏</m:t>
-                                </m:r>
-                              </m:e>
-                              <m:sub>
-                                <m:r>
-                                  <a:rPr lang="en-US" altLang="zh-CN" sz="2400" b="0" i="1" smtClean="0">
-                                    <a:latin typeface="Cambria Math" panose="02040503050406030204" pitchFamily="18" charset="0"/>
-                                  </a:rPr>
-                                  <m:t>𝑙</m:t>
-                                </m:r>
-                              </m:sub>
-                            </m:sSub>
-                          </m:e>
-                        </m:d>
-                        <m:sSub>
-                          <m:sSubPr>
-                            <m:ctrlPr>
-                              <a:rPr lang="en-US" altLang="zh-CN" sz="2400" i="1">
-                                <a:latin typeface="Cambria Math" panose="02040503050406030204" pitchFamily="18" charset="0"/>
-                              </a:rPr>
-                            </m:ctrlPr>
-                          </m:sSubPr>
-                          <m:e>
-                            <m:r>
-                              <a:rPr lang="en-US" altLang="zh-CN" sz="2400" i="1">
-                                <a:latin typeface="Cambria Math" panose="02040503050406030204" pitchFamily="18" charset="0"/>
-                              </a:rPr>
-                              <m:t>𝜂</m:t>
-                            </m:r>
-                          </m:e>
-                          <m:sub>
-                            <m:r>
-                              <a:rPr lang="en-US" altLang="zh-CN" sz="2400" b="0" i="1" smtClean="0">
-                                <a:latin typeface="Cambria Math" panose="02040503050406030204" pitchFamily="18" charset="0"/>
-                              </a:rPr>
-                              <m:t>𝑛</m:t>
-                            </m:r>
-                            <m:r>
-                              <a:rPr lang="en-US" altLang="zh-CN" sz="2400" b="0" i="1" smtClean="0">
-                                <a:latin typeface="Cambria Math" panose="02040503050406030204" pitchFamily="18" charset="0"/>
-                              </a:rPr>
-                              <m:t>,</m:t>
-                            </m:r>
-                            <m:r>
-                              <a:rPr lang="en-US" altLang="zh-CN" sz="2400" i="1">
-                                <a:latin typeface="Cambria Math" panose="02040503050406030204" pitchFamily="18" charset="0"/>
-                              </a:rPr>
-                              <m:t>𝑖</m:t>
-                            </m:r>
-                          </m:sub>
-                        </m:sSub>
-                        <m:r>
-                          <a:rPr lang="en-US" altLang="zh-CN" sz="2400" b="0" i="1" smtClean="0">
-                            <a:latin typeface="Cambria Math" panose="02040503050406030204" pitchFamily="18" charset="0"/>
-                          </a:rPr>
-                          <m:t>=</m:t>
-                        </m:r>
-                        <m:r>
-                          <a:rPr lang="en-US" altLang="zh-CN" sz="2400" b="0" i="1" smtClean="0">
-                            <a:latin typeface="Cambria Math" panose="02040503050406030204" pitchFamily="18" charset="0"/>
-                          </a:rPr>
-                          <m:t>𝑠</m:t>
-                        </m:r>
-                      </m:oMath>
-                    </m:oMathPara>
-                  </a14:m>
-                  <a:endParaRPr lang="zh-CN" altLang="en-US" sz="2400" dirty="0"/>
-                </a:p>
-              </p:txBody>
-            </p:sp>
-          </mc:Choice>
-          <mc:Fallback>
-            <p:sp>
-              <p:nvSpPr>
-                <p:cNvPr id="15" name="TextBox 14">
-                  <a:extLst>
-                    <a:ext uri="{FF2B5EF4-FFF2-40B4-BE49-F238E27FC236}">
-                      <a16:creationId xmlns:a16="http://schemas.microsoft.com/office/drawing/2014/main" id="{1F5BE5D0-CE11-4DB7-93AC-13DB06C6159D}"/>
-                    </a:ext>
-                  </a:extLst>
-                </p:cNvPr>
-                <p:cNvSpPr txBox="1">
-                  <a:spLocks noRot="1" noChangeAspect="1" noMove="1" noResize="1" noEditPoints="1" noAdjustHandles="1" noChangeArrowheads="1" noChangeShapeType="1" noTextEdit="1"/>
-                </p:cNvSpPr>
-                <p:nvPr/>
-              </p:nvSpPr>
-              <p:spPr>
-                <a:xfrm>
-                  <a:off x="3844030" y="1504151"/>
-                  <a:ext cx="2443618" cy="416845"/>
-                </a:xfrm>
-                <a:prstGeom prst="rect">
-                  <a:avLst/>
-                </a:prstGeom>
-                <a:blipFill>
-                  <a:blip r:embed="rId7"/>
-                  <a:stretch>
-                    <a:fillRect/>
-                  </a:stretch>
-                </a:blipFill>
-              </p:spPr>
-              <p:txBody>
-                <a:bodyPr/>
-                <a:lstStyle/>
-                <a:p>
-                  <a:r>
-                    <a:rPr lang="zh-CN" altLang="en-US">
-                      <a:noFill/>
-                    </a:rPr>
-                    <a:t> </a:t>
-                  </a:r>
-                </a:p>
-              </p:txBody>
-            </p:sp>
-          </mc:Fallback>
-        </mc:AlternateContent>
-        <mc:AlternateContent xmlns:mc="http://schemas.openxmlformats.org/markup-compatibility/2006">
-          <mc:Choice xmlns:a14="http://schemas.microsoft.com/office/drawing/2010/main" Requires="a14">
-            <p:sp>
-              <p:nvSpPr>
-                <p:cNvPr id="16" name="TextBox 15">
-                  <a:extLst>
-                    <a:ext uri="{FF2B5EF4-FFF2-40B4-BE49-F238E27FC236}">
-                      <a16:creationId xmlns:a16="http://schemas.microsoft.com/office/drawing/2014/main" id="{A6B7F194-7833-4D6D-A221-06CF3598AC9D}"/>
-                    </a:ext>
-                  </a:extLst>
-                </p:cNvPr>
-                <p:cNvSpPr txBox="1"/>
-                <p:nvPr/>
-              </p:nvSpPr>
-              <p:spPr>
-                <a:xfrm>
-                  <a:off x="5696924" y="4435553"/>
-                  <a:ext cx="2736327" cy="416845"/>
-                </a:xfrm>
-                <a:prstGeom prst="rect">
-                  <a:avLst/>
-                </a:prstGeom>
-                <a:noFill/>
-              </p:spPr>
-              <p:txBody>
-                <a:bodyPr wrap="none" lIns="0" tIns="0" rIns="0" bIns="0" rtlCol="0">
-                  <a:spAutoFit/>
-                </a:bodyPr>
-                <a:lstStyle/>
-                <a:p>
-                  <a:pPr/>
-                  <a14:m>
-                    <m:oMathPara xmlns:m="http://schemas.openxmlformats.org/officeDocument/2006/math">
-                      <m:oMathParaPr>
-                        <m:jc m:val="centerGroup"/>
-                      </m:oMathParaPr>
-                      <m:oMath xmlns:m="http://schemas.openxmlformats.org/officeDocument/2006/math">
-                        <m:d>
-                          <m:dPr>
-                            <m:ctrlPr>
-                              <a:rPr lang="en-US" altLang="zh-CN" sz="2400" b="0" i="1" smtClean="0">
-                                <a:latin typeface="Cambria Math" panose="02040503050406030204" pitchFamily="18" charset="0"/>
-                              </a:rPr>
-                            </m:ctrlPr>
-                          </m:dPr>
-                          <m:e>
-                            <m:sSub>
-                              <m:sSubPr>
-                                <m:ctrlPr>
-                                  <a:rPr lang="en-US" altLang="zh-CN" sz="2400" b="0" i="1" smtClean="0">
-                                    <a:latin typeface="Cambria Math" panose="02040503050406030204" pitchFamily="18" charset="0"/>
-                                  </a:rPr>
-                                </m:ctrlPr>
-                              </m:sSubPr>
-                              <m:e>
-                                <m:r>
-                                  <a:rPr lang="en-US" altLang="zh-CN" sz="2400" b="0" i="1" smtClean="0">
-                                    <a:latin typeface="Cambria Math" panose="02040503050406030204" pitchFamily="18" charset="0"/>
-                                  </a:rPr>
-                                  <m:t>𝑏</m:t>
-                                </m:r>
-                              </m:e>
-                              <m:sub>
-                                <m:r>
-                                  <a:rPr lang="en-US" altLang="zh-CN" sz="2400" b="0" i="1" smtClean="0">
-                                    <a:latin typeface="Cambria Math" panose="02040503050406030204" pitchFamily="18" charset="0"/>
-                                  </a:rPr>
-                                  <m:t>𝑢</m:t>
-                                </m:r>
-                              </m:sub>
-                            </m:sSub>
-                            <m:r>
-                              <a:rPr lang="en-US" altLang="zh-CN" sz="2400" b="0" i="1" smtClean="0">
-                                <a:latin typeface="Cambria Math" panose="02040503050406030204" pitchFamily="18" charset="0"/>
-                              </a:rPr>
-                              <m:t>−</m:t>
-                            </m:r>
-                            <m:sSub>
-                              <m:sSubPr>
-                                <m:ctrlPr>
-                                  <a:rPr lang="en-US" altLang="zh-CN" sz="2400" i="1">
-                                    <a:latin typeface="Cambria Math" panose="02040503050406030204" pitchFamily="18" charset="0"/>
-                                  </a:rPr>
-                                </m:ctrlPr>
-                              </m:sSubPr>
-                              <m:e>
-                                <m:r>
-                                  <a:rPr lang="en-US" altLang="zh-CN" sz="2400" i="1">
-                                    <a:latin typeface="Cambria Math" panose="02040503050406030204" pitchFamily="18" charset="0"/>
-                                  </a:rPr>
-                                  <m:t>𝜆</m:t>
-                                </m:r>
-                              </m:e>
-                              <m:sub>
-                                <m:r>
-                                  <a:rPr lang="en-US" altLang="zh-CN" sz="2400" b="0" i="1" smtClean="0">
-                                    <a:latin typeface="Cambria Math" panose="02040503050406030204" pitchFamily="18" charset="0"/>
-                                  </a:rPr>
-                                  <m:t>𝑛</m:t>
-                                </m:r>
-                                <m:r>
-                                  <a:rPr lang="en-US" altLang="zh-CN" sz="2400" b="0" i="1" smtClean="0">
-                                    <a:latin typeface="Cambria Math" panose="02040503050406030204" pitchFamily="18" charset="0"/>
-                                  </a:rPr>
-                                  <m:t>,</m:t>
-                                </m:r>
-                                <m:r>
-                                  <a:rPr lang="en-US" altLang="zh-CN" sz="2400" i="1">
-                                    <a:latin typeface="Cambria Math" panose="02040503050406030204" pitchFamily="18" charset="0"/>
-                                  </a:rPr>
-                                  <m:t>𝑖</m:t>
-                                </m:r>
-                              </m:sub>
-                            </m:sSub>
-                          </m:e>
-                        </m:d>
-                        <m:sSub>
-                          <m:sSubPr>
-                            <m:ctrlPr>
-                              <a:rPr lang="en-US" altLang="zh-CN" sz="2400" i="1">
-                                <a:latin typeface="Cambria Math" panose="02040503050406030204" pitchFamily="18" charset="0"/>
-                              </a:rPr>
-                            </m:ctrlPr>
-                          </m:sSubPr>
-                          <m:e>
-                            <m:r>
-                              <a:rPr lang="en-US" altLang="zh-CN" sz="2400" i="1">
-                                <a:latin typeface="Cambria Math" panose="02040503050406030204" pitchFamily="18" charset="0"/>
-                              </a:rPr>
-                              <m:t>𝜂</m:t>
-                            </m:r>
-                          </m:e>
-                          <m:sub>
-                            <m:r>
-                              <a:rPr lang="en-US" altLang="zh-CN" sz="2400" b="0" i="1" smtClean="0">
-                                <a:latin typeface="Cambria Math" panose="02040503050406030204" pitchFamily="18" charset="0"/>
-                              </a:rPr>
-                              <m:t>𝑛</m:t>
-                            </m:r>
-                            <m:r>
-                              <a:rPr lang="en-US" altLang="zh-CN" sz="2400" b="0" i="1" smtClean="0">
-                                <a:latin typeface="Cambria Math" panose="02040503050406030204" pitchFamily="18" charset="0"/>
-                              </a:rPr>
-                              <m:t>,</m:t>
-                            </m:r>
-                            <m:r>
-                              <a:rPr lang="en-US" altLang="zh-CN" sz="2400" i="1">
-                                <a:latin typeface="Cambria Math" panose="02040503050406030204" pitchFamily="18" charset="0"/>
-                              </a:rPr>
-                              <m:t>𝑖</m:t>
-                            </m:r>
-                          </m:sub>
-                        </m:sSub>
-                        <m:r>
-                          <a:rPr lang="en-US" altLang="zh-CN" sz="2400" b="0" i="1" smtClean="0">
-                            <a:latin typeface="Cambria Math" panose="02040503050406030204" pitchFamily="18" charset="0"/>
-                          </a:rPr>
-                          <m:t>=−</m:t>
-                        </m:r>
-                        <m:r>
-                          <a:rPr lang="en-US" altLang="zh-CN" sz="2400" b="0" i="1" smtClean="0">
-                            <a:latin typeface="Cambria Math" panose="02040503050406030204" pitchFamily="18" charset="0"/>
-                          </a:rPr>
-                          <m:t>𝑠</m:t>
-                        </m:r>
-                      </m:oMath>
-                    </m:oMathPara>
-                  </a14:m>
-                  <a:endParaRPr lang="zh-CN" altLang="en-US" sz="2400" dirty="0"/>
-                </a:p>
-              </p:txBody>
-            </p:sp>
-          </mc:Choice>
-          <mc:Fallback>
-            <p:sp>
-              <p:nvSpPr>
-                <p:cNvPr id="16" name="TextBox 15">
-                  <a:extLst>
-                    <a:ext uri="{FF2B5EF4-FFF2-40B4-BE49-F238E27FC236}">
-                      <a16:creationId xmlns:a16="http://schemas.microsoft.com/office/drawing/2014/main" id="{A6B7F194-7833-4D6D-A221-06CF3598AC9D}"/>
-                    </a:ext>
-                  </a:extLst>
-                </p:cNvPr>
-                <p:cNvSpPr txBox="1">
-                  <a:spLocks noRot="1" noChangeAspect="1" noMove="1" noResize="1" noEditPoints="1" noAdjustHandles="1" noChangeArrowheads="1" noChangeShapeType="1" noTextEdit="1"/>
-                </p:cNvSpPr>
-                <p:nvPr/>
-              </p:nvSpPr>
-              <p:spPr>
-                <a:xfrm>
-                  <a:off x="5696924" y="4435553"/>
-                  <a:ext cx="2736327" cy="416845"/>
-                </a:xfrm>
-                <a:prstGeom prst="rect">
-                  <a:avLst/>
-                </a:prstGeom>
-                <a:blipFill>
-                  <a:blip r:embed="rId8"/>
-                  <a:stretch>
-                    <a:fillRect/>
-                  </a:stretch>
-                </a:blipFill>
-              </p:spPr>
-              <p:txBody>
-                <a:bodyPr/>
-                <a:lstStyle/>
-                <a:p>
-                  <a:r>
-                    <a:rPr lang="zh-CN" altLang="en-US">
-                      <a:noFill/>
-                    </a:rPr>
-                    <a:t> </a:t>
-                  </a:r>
-                </a:p>
-              </p:txBody>
-            </p:sp>
-          </mc:Fallback>
-        </mc:AlternateContent>
-        <p:cxnSp>
-          <p:nvCxnSpPr>
-            <p:cNvPr id="17" name="Straight Arrow Connector 16">
-              <a:extLst>
-                <a:ext uri="{FF2B5EF4-FFF2-40B4-BE49-F238E27FC236}">
-                  <a16:creationId xmlns:a16="http://schemas.microsoft.com/office/drawing/2014/main" id="{2085D927-28F5-4AC7-85D1-8302DF12161C}"/>
-                </a:ext>
-              </a:extLst>
-            </p:cNvPr>
-            <p:cNvCxnSpPr>
-              <a:cxnSpLocks/>
-            </p:cNvCxnSpPr>
-            <p:nvPr/>
-          </p:nvCxnSpPr>
-          <p:spPr>
-            <a:xfrm flipV="1">
-              <a:off x="7579023" y="3930509"/>
-              <a:ext cx="854228" cy="620816"/>
-            </a:xfrm>
-            <a:prstGeom prst="straightConnector1">
-              <a:avLst/>
-            </a:prstGeom>
-            <a:ln>
-              <a:tailEnd type="triangle"/>
-            </a:ln>
-          </p:spPr>
-          <p:style>
-            <a:lnRef idx="1">
-              <a:schemeClr val="dk1"/>
-            </a:lnRef>
-            <a:fillRef idx="0">
-              <a:schemeClr val="dk1"/>
-            </a:fillRef>
-            <a:effectRef idx="0">
-              <a:schemeClr val="dk1"/>
-            </a:effectRef>
-            <a:fontRef idx="minor">
-              <a:schemeClr val="tx1"/>
-            </a:fontRef>
-          </p:style>
-        </p:cxnSp>
+          </p:grpSpPr>
+          <mc:AlternateContent xmlns:mc="http://schemas.openxmlformats.org/markup-compatibility/2006">
+            <mc:Choice xmlns:a14="http://schemas.microsoft.com/office/drawing/2010/main" Requires="a14">
+              <p:sp>
+                <p:nvSpPr>
+                  <p:cNvPr id="8" name="TextBox 7">
+                    <a:extLst>
+                      <a:ext uri="{FF2B5EF4-FFF2-40B4-BE49-F238E27FC236}">
+                        <a16:creationId xmlns:a16="http://schemas.microsoft.com/office/drawing/2014/main" id="{A2581CEA-52DF-4FA3-AC0B-8E3E8AC7E98D}"/>
+                      </a:ext>
+                    </a:extLst>
+                  </p:cNvPr>
+                  <p:cNvSpPr txBox="1"/>
+                  <p:nvPr/>
+                </p:nvSpPr>
+                <p:spPr>
+                  <a:xfrm>
+                    <a:off x="2913976" y="3689891"/>
+                    <a:ext cx="1195007" cy="385555"/>
+                  </a:xfrm>
+                  <a:prstGeom prst="rect">
+                    <a:avLst/>
+                  </a:prstGeom>
+                  <a:noFill/>
+                </p:spPr>
+                <p:txBody>
+                  <a:bodyPr wrap="none" lIns="0" tIns="0" rIns="0" bIns="0" rtlCol="0">
+                    <a:spAutoFit/>
+                  </a:bodyPr>
+                  <a:lstStyle/>
+                  <a:p>
+                    <a:pPr/>
+                    <a14:m>
+                      <m:oMathPara xmlns:m="http://schemas.openxmlformats.org/officeDocument/2006/math">
+                        <m:oMathParaPr>
+                          <m:jc m:val="centerGroup"/>
+                        </m:oMathParaPr>
+                        <m:oMath xmlns:m="http://schemas.openxmlformats.org/officeDocument/2006/math">
+                          <m:sSub>
+                            <m:sSubPr>
+                              <m:ctrlPr>
+                                <a:rPr lang="en-US" altLang="zh-CN" sz="2400" b="0" i="1" smtClean="0">
+                                  <a:latin typeface="Cambria Math" panose="02040503050406030204" pitchFamily="18" charset="0"/>
+                                </a:rPr>
+                              </m:ctrlPr>
+                            </m:sSubPr>
+                            <m:e>
+                              <m:r>
+                                <a:rPr lang="en-US" altLang="zh-CN" sz="2400" b="0" i="1" smtClean="0">
+                                  <a:latin typeface="Cambria Math" panose="02040503050406030204" pitchFamily="18" charset="0"/>
+                                </a:rPr>
+                                <m:t>𝜆</m:t>
+                              </m:r>
+                            </m:e>
+                            <m:sub>
+                              <m:r>
+                                <a:rPr lang="en-US" altLang="zh-CN" sz="2400" b="0" i="1" smtClean="0">
+                                  <a:latin typeface="Cambria Math" panose="02040503050406030204" pitchFamily="18" charset="0"/>
+                                </a:rPr>
+                                <m:t>𝑛</m:t>
+                              </m:r>
+                              <m:r>
+                                <a:rPr lang="en-US" altLang="zh-CN" sz="2400" b="0" i="1" smtClean="0">
+                                  <a:latin typeface="Cambria Math" panose="02040503050406030204" pitchFamily="18" charset="0"/>
+                                </a:rPr>
+                                <m:t>,</m:t>
+                              </m:r>
+                              <m:r>
+                                <a:rPr lang="en-US" altLang="zh-CN" sz="2400" b="0" i="1" smtClean="0">
+                                  <a:latin typeface="Cambria Math" panose="02040503050406030204" pitchFamily="18" charset="0"/>
+                                </a:rPr>
+                                <m:t>𝑖</m:t>
+                              </m:r>
+                            </m:sub>
+                          </m:sSub>
+                          <m:r>
+                            <a:rPr lang="en-US" altLang="zh-CN" sz="2400" b="0" i="1" smtClean="0">
+                              <a:latin typeface="Cambria Math" panose="02040503050406030204" pitchFamily="18" charset="0"/>
+                            </a:rPr>
+                            <m:t>=</m:t>
+                          </m:r>
+                          <m:sSub>
+                            <m:sSubPr>
+                              <m:ctrlPr>
+                                <a:rPr lang="en-US" altLang="zh-CN" sz="2400" b="0" i="1" smtClean="0">
+                                  <a:latin typeface="Cambria Math" panose="02040503050406030204" pitchFamily="18" charset="0"/>
+                                </a:rPr>
+                              </m:ctrlPr>
+                            </m:sSubPr>
+                            <m:e>
+                              <m:r>
+                                <a:rPr lang="en-US" altLang="zh-CN" sz="2400" b="0" i="1" smtClean="0">
+                                  <a:latin typeface="Cambria Math" panose="02040503050406030204" pitchFamily="18" charset="0"/>
+                                </a:rPr>
+                                <m:t>𝑏</m:t>
+                              </m:r>
+                            </m:e>
+                            <m:sub>
+                              <m:r>
+                                <a:rPr lang="en-US" altLang="zh-CN" sz="2400" b="0" i="1" smtClean="0">
+                                  <a:latin typeface="Cambria Math" panose="02040503050406030204" pitchFamily="18" charset="0"/>
+                                </a:rPr>
+                                <m:t>𝑙</m:t>
+                              </m:r>
+                            </m:sub>
+                          </m:sSub>
+                        </m:oMath>
+                      </m:oMathPara>
+                    </a14:m>
+                    <a:endParaRPr lang="zh-CN" altLang="en-US" sz="2400" dirty="0"/>
+                  </a:p>
+                </p:txBody>
+              </p:sp>
+            </mc:Choice>
+            <mc:Fallback>
+              <p:sp>
+                <p:nvSpPr>
+                  <p:cNvPr id="8" name="TextBox 7">
+                    <a:extLst>
+                      <a:ext uri="{FF2B5EF4-FFF2-40B4-BE49-F238E27FC236}">
+                        <a16:creationId xmlns:a16="http://schemas.microsoft.com/office/drawing/2014/main" id="{A2581CEA-52DF-4FA3-AC0B-8E3E8AC7E98D}"/>
+                      </a:ext>
+                    </a:extLst>
+                  </p:cNvPr>
+                  <p:cNvSpPr txBox="1">
+                    <a:spLocks noRot="1" noChangeAspect="1" noMove="1" noResize="1" noEditPoints="1" noAdjustHandles="1" noChangeArrowheads="1" noChangeShapeType="1" noTextEdit="1"/>
+                  </p:cNvSpPr>
+                  <p:nvPr/>
+                </p:nvSpPr>
+                <p:spPr>
+                  <a:xfrm>
+                    <a:off x="2913976" y="3689891"/>
+                    <a:ext cx="1195007" cy="385555"/>
+                  </a:xfrm>
+                  <a:prstGeom prst="rect">
+                    <a:avLst/>
+                  </a:prstGeom>
+                  <a:blipFill>
+                    <a:blip r:embed="rId3"/>
+                    <a:stretch>
+                      <a:fillRect l="-5102" r="-1020" b="-10938"/>
+                    </a:stretch>
+                  </a:blipFill>
+                </p:spPr>
+                <p:txBody>
+                  <a:bodyPr/>
+                  <a:lstStyle/>
+                  <a:p>
+                    <a:r>
+                      <a:rPr lang="zh-CN" altLang="en-US">
+                        <a:noFill/>
+                      </a:rPr>
+                      <a:t> </a:t>
+                    </a:r>
+                  </a:p>
+                </p:txBody>
+              </p:sp>
+            </mc:Fallback>
+          </mc:AlternateContent>
+          <p:cxnSp>
+            <p:nvCxnSpPr>
+              <p:cNvPr id="9" name="Straight Arrow Connector 8">
+                <a:extLst>
+                  <a:ext uri="{FF2B5EF4-FFF2-40B4-BE49-F238E27FC236}">
+                    <a16:creationId xmlns:a16="http://schemas.microsoft.com/office/drawing/2014/main" id="{390CF0F9-08F0-47D4-A046-19F6F292B61A}"/>
+                  </a:ext>
+                </a:extLst>
+              </p:cNvPr>
+              <p:cNvCxnSpPr>
+                <a:cxnSpLocks/>
+              </p:cNvCxnSpPr>
+              <p:nvPr/>
+            </p:nvCxnSpPr>
+            <p:spPr>
+              <a:xfrm flipV="1">
+                <a:off x="3261360" y="3003845"/>
+                <a:ext cx="360691" cy="562315"/>
+              </a:xfrm>
+              <a:prstGeom prst="straightConnector1">
+                <a:avLst/>
+              </a:prstGeom>
+              <a:ln>
+                <a:tailEnd type="triangle"/>
+              </a:ln>
+            </p:spPr>
+            <p:style>
+              <a:lnRef idx="1">
+                <a:schemeClr val="dk1"/>
+              </a:lnRef>
+              <a:fillRef idx="0">
+                <a:schemeClr val="dk1"/>
+              </a:fillRef>
+              <a:effectRef idx="0">
+                <a:schemeClr val="dk1"/>
+              </a:effectRef>
+              <a:fontRef idx="minor">
+                <a:schemeClr val="tx1"/>
+              </a:fontRef>
+            </p:style>
+          </p:cxnSp>
+          <mc:AlternateContent xmlns:mc="http://schemas.openxmlformats.org/markup-compatibility/2006">
+            <mc:Choice xmlns:a14="http://schemas.microsoft.com/office/drawing/2010/main" Requires="a14">
+              <p:sp>
+                <p:nvSpPr>
+                  <p:cNvPr id="10" name="TextBox 9">
+                    <a:extLst>
+                      <a:ext uri="{FF2B5EF4-FFF2-40B4-BE49-F238E27FC236}">
+                        <a16:creationId xmlns:a16="http://schemas.microsoft.com/office/drawing/2014/main" id="{B90BEB51-ECC4-48E3-AD2C-FE0B6AAF912F}"/>
+                      </a:ext>
+                    </a:extLst>
+                  </p:cNvPr>
+                  <p:cNvSpPr txBox="1"/>
+                  <p:nvPr/>
+                </p:nvSpPr>
+                <p:spPr>
+                  <a:xfrm>
+                    <a:off x="9166711" y="4358546"/>
+                    <a:ext cx="1258486" cy="385555"/>
+                  </a:xfrm>
+                  <a:prstGeom prst="rect">
+                    <a:avLst/>
+                  </a:prstGeom>
+                  <a:noFill/>
+                </p:spPr>
+                <p:txBody>
+                  <a:bodyPr wrap="none" lIns="0" tIns="0" rIns="0" bIns="0" rtlCol="0">
+                    <a:spAutoFit/>
+                  </a:bodyPr>
+                  <a:lstStyle/>
+                  <a:p>
+                    <a:pPr/>
+                    <a14:m>
+                      <m:oMathPara xmlns:m="http://schemas.openxmlformats.org/officeDocument/2006/math">
+                        <m:oMathParaPr>
+                          <m:jc m:val="centerGroup"/>
+                        </m:oMathParaPr>
+                        <m:oMath xmlns:m="http://schemas.openxmlformats.org/officeDocument/2006/math">
+                          <m:sSub>
+                            <m:sSubPr>
+                              <m:ctrlPr>
+                                <a:rPr lang="en-US" altLang="zh-CN" sz="2400" b="0" i="1" smtClean="0">
+                                  <a:latin typeface="Cambria Math" panose="02040503050406030204" pitchFamily="18" charset="0"/>
+                                </a:rPr>
+                              </m:ctrlPr>
+                            </m:sSubPr>
+                            <m:e>
+                              <m:r>
+                                <a:rPr lang="en-US" altLang="zh-CN" sz="2400" b="0" i="1" smtClean="0">
+                                  <a:latin typeface="Cambria Math" panose="02040503050406030204" pitchFamily="18" charset="0"/>
+                                </a:rPr>
+                                <m:t>𝜆</m:t>
+                              </m:r>
+                            </m:e>
+                            <m:sub>
+                              <m:r>
+                                <a:rPr lang="en-US" altLang="zh-CN" sz="2400" b="0" i="1" smtClean="0">
+                                  <a:latin typeface="Cambria Math" panose="02040503050406030204" pitchFamily="18" charset="0"/>
+                                </a:rPr>
+                                <m:t>𝑛</m:t>
+                              </m:r>
+                              <m:r>
+                                <a:rPr lang="en-US" altLang="zh-CN" sz="2400" b="0" i="1" smtClean="0">
+                                  <a:latin typeface="Cambria Math" panose="02040503050406030204" pitchFamily="18" charset="0"/>
+                                </a:rPr>
+                                <m:t>,</m:t>
+                              </m:r>
+                              <m:r>
+                                <a:rPr lang="en-US" altLang="zh-CN" sz="2400" b="0" i="1" smtClean="0">
+                                  <a:latin typeface="Cambria Math" panose="02040503050406030204" pitchFamily="18" charset="0"/>
+                                </a:rPr>
+                                <m:t>𝑖</m:t>
+                              </m:r>
+                            </m:sub>
+                          </m:sSub>
+                          <m:r>
+                            <a:rPr lang="en-US" altLang="zh-CN" sz="2400" b="0" i="1" smtClean="0">
+                              <a:latin typeface="Cambria Math" panose="02040503050406030204" pitchFamily="18" charset="0"/>
+                            </a:rPr>
+                            <m:t>=</m:t>
+                          </m:r>
+                          <m:sSub>
+                            <m:sSubPr>
+                              <m:ctrlPr>
+                                <a:rPr lang="en-US" altLang="zh-CN" sz="2400" b="0" i="1" smtClean="0">
+                                  <a:latin typeface="Cambria Math" panose="02040503050406030204" pitchFamily="18" charset="0"/>
+                                </a:rPr>
+                              </m:ctrlPr>
+                            </m:sSubPr>
+                            <m:e>
+                              <m:r>
+                                <a:rPr lang="en-US" altLang="zh-CN" sz="2400" b="0" i="1" smtClean="0">
+                                  <a:latin typeface="Cambria Math" panose="02040503050406030204" pitchFamily="18" charset="0"/>
+                                </a:rPr>
+                                <m:t>𝑏</m:t>
+                              </m:r>
+                            </m:e>
+                            <m:sub>
+                              <m:r>
+                                <a:rPr lang="en-US" altLang="zh-CN" sz="2400" b="0" i="1" smtClean="0">
+                                  <a:latin typeface="Cambria Math" panose="02040503050406030204" pitchFamily="18" charset="0"/>
+                                </a:rPr>
+                                <m:t>𝑢</m:t>
+                              </m:r>
+                            </m:sub>
+                          </m:sSub>
+                        </m:oMath>
+                      </m:oMathPara>
+                    </a14:m>
+                    <a:endParaRPr lang="zh-CN" altLang="en-US" sz="2400" dirty="0"/>
+                  </a:p>
+                </p:txBody>
+              </p:sp>
+            </mc:Choice>
+            <mc:Fallback>
+              <p:sp>
+                <p:nvSpPr>
+                  <p:cNvPr id="10" name="TextBox 9">
+                    <a:extLst>
+                      <a:ext uri="{FF2B5EF4-FFF2-40B4-BE49-F238E27FC236}">
+                        <a16:creationId xmlns:a16="http://schemas.microsoft.com/office/drawing/2014/main" id="{B90BEB51-ECC4-48E3-AD2C-FE0B6AAF912F}"/>
+                      </a:ext>
+                    </a:extLst>
+                  </p:cNvPr>
+                  <p:cNvSpPr txBox="1">
+                    <a:spLocks noRot="1" noChangeAspect="1" noMove="1" noResize="1" noEditPoints="1" noAdjustHandles="1" noChangeArrowheads="1" noChangeShapeType="1" noTextEdit="1"/>
+                  </p:cNvSpPr>
+                  <p:nvPr/>
+                </p:nvSpPr>
+                <p:spPr>
+                  <a:xfrm>
+                    <a:off x="9166711" y="4358546"/>
+                    <a:ext cx="1258486" cy="385555"/>
+                  </a:xfrm>
+                  <a:prstGeom prst="rect">
+                    <a:avLst/>
+                  </a:prstGeom>
+                  <a:blipFill>
+                    <a:blip r:embed="rId4"/>
+                    <a:stretch>
+                      <a:fillRect l="-4854" b="-12698"/>
+                    </a:stretch>
+                  </a:blipFill>
+                </p:spPr>
+                <p:txBody>
+                  <a:bodyPr/>
+                  <a:lstStyle/>
+                  <a:p>
+                    <a:r>
+                      <a:rPr lang="zh-CN" altLang="en-US">
+                        <a:noFill/>
+                      </a:rPr>
+                      <a:t> </a:t>
+                    </a:r>
+                  </a:p>
+                </p:txBody>
+              </p:sp>
+            </mc:Fallback>
+          </mc:AlternateContent>
+          <p:cxnSp>
+            <p:nvCxnSpPr>
+              <p:cNvPr id="11" name="Straight Arrow Connector 10">
+                <a:extLst>
+                  <a:ext uri="{FF2B5EF4-FFF2-40B4-BE49-F238E27FC236}">
+                    <a16:creationId xmlns:a16="http://schemas.microsoft.com/office/drawing/2014/main" id="{32DAB4DB-B337-4630-8977-46E82CC6A972}"/>
+                  </a:ext>
+                </a:extLst>
+              </p:cNvPr>
+              <p:cNvCxnSpPr>
+                <a:cxnSpLocks/>
+              </p:cNvCxnSpPr>
+              <p:nvPr/>
+            </p:nvCxnSpPr>
+            <p:spPr>
+              <a:xfrm flipH="1">
+                <a:off x="8841531" y="4551324"/>
+                <a:ext cx="293346" cy="0"/>
+              </a:xfrm>
+              <a:prstGeom prst="straightConnector1">
+                <a:avLst/>
+              </a:prstGeom>
+              <a:ln>
+                <a:tailEnd type="triangle"/>
+              </a:ln>
+            </p:spPr>
+            <p:style>
+              <a:lnRef idx="1">
+                <a:schemeClr val="dk1"/>
+              </a:lnRef>
+              <a:fillRef idx="0">
+                <a:schemeClr val="dk1"/>
+              </a:fillRef>
+              <a:effectRef idx="0">
+                <a:schemeClr val="dk1"/>
+              </a:effectRef>
+              <a:fontRef idx="minor">
+                <a:schemeClr val="tx1"/>
+              </a:fontRef>
+            </p:style>
+          </p:cxnSp>
+          <p:cxnSp>
+            <p:nvCxnSpPr>
+              <p:cNvPr id="14" name="Straight Arrow Connector 13">
+                <a:extLst>
+                  <a:ext uri="{FF2B5EF4-FFF2-40B4-BE49-F238E27FC236}">
+                    <a16:creationId xmlns:a16="http://schemas.microsoft.com/office/drawing/2014/main" id="{5D10C65A-9DD5-4ACF-8752-79581598CFD8}"/>
+                  </a:ext>
+                </a:extLst>
+              </p:cNvPr>
+              <p:cNvCxnSpPr>
+                <a:cxnSpLocks/>
+              </p:cNvCxnSpPr>
+              <p:nvPr/>
+            </p:nvCxnSpPr>
+            <p:spPr>
+              <a:xfrm flipH="1">
+                <a:off x="4220099" y="2172845"/>
+                <a:ext cx="504301" cy="737999"/>
+              </a:xfrm>
+              <a:prstGeom prst="straightConnector1">
+                <a:avLst/>
+              </a:prstGeom>
+              <a:ln>
+                <a:tailEnd type="triangle"/>
+              </a:ln>
+            </p:spPr>
+            <p:style>
+              <a:lnRef idx="1">
+                <a:schemeClr val="dk1"/>
+              </a:lnRef>
+              <a:fillRef idx="0">
+                <a:schemeClr val="dk1"/>
+              </a:fillRef>
+              <a:effectRef idx="0">
+                <a:schemeClr val="dk1"/>
+              </a:effectRef>
+              <a:fontRef idx="minor">
+                <a:schemeClr val="tx1"/>
+              </a:fontRef>
+            </p:style>
+          </p:cxnSp>
+          <mc:AlternateContent xmlns:mc="http://schemas.openxmlformats.org/markup-compatibility/2006">
+            <mc:Choice xmlns:a14="http://schemas.microsoft.com/office/drawing/2010/main" Requires="a14">
+              <p:sp>
+                <p:nvSpPr>
+                  <p:cNvPr id="15" name="TextBox 14">
+                    <a:extLst>
+                      <a:ext uri="{FF2B5EF4-FFF2-40B4-BE49-F238E27FC236}">
+                        <a16:creationId xmlns:a16="http://schemas.microsoft.com/office/drawing/2014/main" id="{1F5BE5D0-CE11-4DB7-93AC-13DB06C6159D}"/>
+                      </a:ext>
+                    </a:extLst>
+                  </p:cNvPr>
+                  <p:cNvSpPr txBox="1"/>
+                  <p:nvPr/>
+                </p:nvSpPr>
+                <p:spPr>
+                  <a:xfrm>
+                    <a:off x="3803295" y="1694134"/>
+                    <a:ext cx="2443618" cy="416845"/>
+                  </a:xfrm>
+                  <a:prstGeom prst="rect">
+                    <a:avLst/>
+                  </a:prstGeom>
+                  <a:noFill/>
+                </p:spPr>
+                <p:txBody>
+                  <a:bodyPr wrap="none" lIns="0" tIns="0" rIns="0" bIns="0" rtlCol="0">
+                    <a:spAutoFit/>
+                  </a:bodyPr>
+                  <a:lstStyle/>
+                  <a:p>
+                    <a:pPr/>
+                    <a14:m>
+                      <m:oMathPara xmlns:m="http://schemas.openxmlformats.org/officeDocument/2006/math">
+                        <m:oMathParaPr>
+                          <m:jc m:val="centerGroup"/>
+                        </m:oMathParaPr>
+                        <m:oMath xmlns:m="http://schemas.openxmlformats.org/officeDocument/2006/math">
+                          <m:d>
+                            <m:dPr>
+                              <m:ctrlPr>
+                                <a:rPr lang="en-US" altLang="zh-CN" sz="2400" b="0" i="1" smtClean="0">
+                                  <a:latin typeface="Cambria Math" panose="02040503050406030204" pitchFamily="18" charset="0"/>
+                                </a:rPr>
+                              </m:ctrlPr>
+                            </m:dPr>
+                            <m:e>
+                              <m:sSub>
+                                <m:sSubPr>
+                                  <m:ctrlPr>
+                                    <a:rPr lang="en-US" altLang="zh-CN" sz="2400" b="0" i="1" smtClean="0">
+                                      <a:latin typeface="Cambria Math" panose="02040503050406030204" pitchFamily="18" charset="0"/>
+                                    </a:rPr>
+                                  </m:ctrlPr>
+                                </m:sSubPr>
+                                <m:e>
+                                  <m:r>
+                                    <a:rPr lang="en-US" altLang="zh-CN" sz="2400" b="0" i="1" smtClean="0">
+                                      <a:latin typeface="Cambria Math" panose="02040503050406030204" pitchFamily="18" charset="0"/>
+                                    </a:rPr>
+                                    <m:t>𝜆</m:t>
+                                  </m:r>
+                                </m:e>
+                                <m:sub>
+                                  <m:r>
+                                    <a:rPr lang="en-US" altLang="zh-CN" sz="2400" b="0" i="1" smtClean="0">
+                                      <a:latin typeface="Cambria Math" panose="02040503050406030204" pitchFamily="18" charset="0"/>
+                                    </a:rPr>
+                                    <m:t>𝑛</m:t>
+                                  </m:r>
+                                  <m:r>
+                                    <a:rPr lang="en-US" altLang="zh-CN" sz="2400" b="0" i="1" smtClean="0">
+                                      <a:latin typeface="Cambria Math" panose="02040503050406030204" pitchFamily="18" charset="0"/>
+                                    </a:rPr>
+                                    <m:t>,</m:t>
+                                  </m:r>
+                                  <m:r>
+                                    <a:rPr lang="en-US" altLang="zh-CN" sz="2400" b="0" i="1" smtClean="0">
+                                      <a:latin typeface="Cambria Math" panose="02040503050406030204" pitchFamily="18" charset="0"/>
+                                    </a:rPr>
+                                    <m:t>𝑖</m:t>
+                                  </m:r>
+                                </m:sub>
+                              </m:sSub>
+                              <m:r>
+                                <a:rPr lang="en-US" altLang="zh-CN" sz="2400" b="0" i="1" smtClean="0">
+                                  <a:latin typeface="Cambria Math" panose="02040503050406030204" pitchFamily="18" charset="0"/>
+                                </a:rPr>
+                                <m:t>−</m:t>
+                              </m:r>
+                              <m:sSub>
+                                <m:sSubPr>
+                                  <m:ctrlPr>
+                                    <a:rPr lang="en-US" altLang="zh-CN" sz="2400" b="0" i="1" smtClean="0">
+                                      <a:latin typeface="Cambria Math" panose="02040503050406030204" pitchFamily="18" charset="0"/>
+                                    </a:rPr>
+                                  </m:ctrlPr>
+                                </m:sSubPr>
+                                <m:e>
+                                  <m:r>
+                                    <a:rPr lang="en-US" altLang="zh-CN" sz="2400" b="0" i="1" smtClean="0">
+                                      <a:latin typeface="Cambria Math" panose="02040503050406030204" pitchFamily="18" charset="0"/>
+                                    </a:rPr>
+                                    <m:t>𝑏</m:t>
+                                  </m:r>
+                                </m:e>
+                                <m:sub>
+                                  <m:r>
+                                    <a:rPr lang="en-US" altLang="zh-CN" sz="2400" b="0" i="1" smtClean="0">
+                                      <a:latin typeface="Cambria Math" panose="02040503050406030204" pitchFamily="18" charset="0"/>
+                                    </a:rPr>
+                                    <m:t>𝑙</m:t>
+                                  </m:r>
+                                </m:sub>
+                              </m:sSub>
+                            </m:e>
+                          </m:d>
+                          <m:sSub>
+                            <m:sSubPr>
+                              <m:ctrlPr>
+                                <a:rPr lang="en-US" altLang="zh-CN" sz="2400" i="1">
+                                  <a:latin typeface="Cambria Math" panose="02040503050406030204" pitchFamily="18" charset="0"/>
+                                </a:rPr>
+                              </m:ctrlPr>
+                            </m:sSubPr>
+                            <m:e>
+                              <m:r>
+                                <a:rPr lang="en-US" altLang="zh-CN" sz="2400" i="1">
+                                  <a:latin typeface="Cambria Math" panose="02040503050406030204" pitchFamily="18" charset="0"/>
+                                </a:rPr>
+                                <m:t>𝜂</m:t>
+                              </m:r>
+                            </m:e>
+                            <m:sub>
+                              <m:r>
+                                <a:rPr lang="en-US" altLang="zh-CN" sz="2400" b="0" i="1" smtClean="0">
+                                  <a:latin typeface="Cambria Math" panose="02040503050406030204" pitchFamily="18" charset="0"/>
+                                </a:rPr>
+                                <m:t>𝑛</m:t>
+                              </m:r>
+                              <m:r>
+                                <a:rPr lang="en-US" altLang="zh-CN" sz="2400" b="0" i="1" smtClean="0">
+                                  <a:latin typeface="Cambria Math" panose="02040503050406030204" pitchFamily="18" charset="0"/>
+                                </a:rPr>
+                                <m:t>,</m:t>
+                              </m:r>
+                              <m:r>
+                                <a:rPr lang="en-US" altLang="zh-CN" sz="2400" i="1">
+                                  <a:latin typeface="Cambria Math" panose="02040503050406030204" pitchFamily="18" charset="0"/>
+                                </a:rPr>
+                                <m:t>𝑖</m:t>
+                              </m:r>
+                            </m:sub>
+                          </m:sSub>
+                          <m:r>
+                            <a:rPr lang="en-US" altLang="zh-CN" sz="2400" b="0" i="1" smtClean="0">
+                              <a:latin typeface="Cambria Math" panose="02040503050406030204" pitchFamily="18" charset="0"/>
+                            </a:rPr>
+                            <m:t>=</m:t>
+                          </m:r>
+                          <m:r>
+                            <a:rPr lang="en-US" altLang="zh-CN" sz="2400" b="0" i="1" smtClean="0">
+                              <a:latin typeface="Cambria Math" panose="02040503050406030204" pitchFamily="18" charset="0"/>
+                            </a:rPr>
+                            <m:t>𝑠</m:t>
+                          </m:r>
+                        </m:oMath>
+                      </m:oMathPara>
+                    </a14:m>
+                    <a:endParaRPr lang="zh-CN" altLang="en-US" sz="2400" dirty="0"/>
+                  </a:p>
+                </p:txBody>
+              </p:sp>
+            </mc:Choice>
+            <mc:Fallback>
+              <p:sp>
+                <p:nvSpPr>
+                  <p:cNvPr id="15" name="TextBox 14">
+                    <a:extLst>
+                      <a:ext uri="{FF2B5EF4-FFF2-40B4-BE49-F238E27FC236}">
+                        <a16:creationId xmlns:a16="http://schemas.microsoft.com/office/drawing/2014/main" id="{1F5BE5D0-CE11-4DB7-93AC-13DB06C6159D}"/>
+                      </a:ext>
+                    </a:extLst>
+                  </p:cNvPr>
+                  <p:cNvSpPr txBox="1">
+                    <a:spLocks noRot="1" noChangeAspect="1" noMove="1" noResize="1" noEditPoints="1" noAdjustHandles="1" noChangeArrowheads="1" noChangeShapeType="1" noTextEdit="1"/>
+                  </p:cNvSpPr>
+                  <p:nvPr/>
+                </p:nvSpPr>
+                <p:spPr>
+                  <a:xfrm>
+                    <a:off x="3803295" y="1694134"/>
+                    <a:ext cx="2443618" cy="416845"/>
+                  </a:xfrm>
+                  <a:prstGeom prst="rect">
+                    <a:avLst/>
+                  </a:prstGeom>
+                  <a:blipFill>
+                    <a:blip r:embed="rId5"/>
+                    <a:stretch>
+                      <a:fillRect/>
+                    </a:stretch>
+                  </a:blipFill>
+                </p:spPr>
+                <p:txBody>
+                  <a:bodyPr/>
+                  <a:lstStyle/>
+                  <a:p>
+                    <a:r>
+                      <a:rPr lang="zh-CN" altLang="en-US">
+                        <a:noFill/>
+                      </a:rPr>
+                      <a:t> </a:t>
+                    </a:r>
+                  </a:p>
+                </p:txBody>
+              </p:sp>
+            </mc:Fallback>
+          </mc:AlternateContent>
+          <mc:AlternateContent xmlns:mc="http://schemas.openxmlformats.org/markup-compatibility/2006">
+            <mc:Choice xmlns:a14="http://schemas.microsoft.com/office/drawing/2010/main" Requires="a14">
+              <p:sp>
+                <p:nvSpPr>
+                  <p:cNvPr id="16" name="TextBox 15">
+                    <a:extLst>
+                      <a:ext uri="{FF2B5EF4-FFF2-40B4-BE49-F238E27FC236}">
+                        <a16:creationId xmlns:a16="http://schemas.microsoft.com/office/drawing/2014/main" id="{A6B7F194-7833-4D6D-A221-06CF3598AC9D}"/>
+                      </a:ext>
+                    </a:extLst>
+                  </p:cNvPr>
+                  <p:cNvSpPr txBox="1"/>
+                  <p:nvPr/>
+                </p:nvSpPr>
+                <p:spPr>
+                  <a:xfrm>
+                    <a:off x="5732407" y="4579739"/>
+                    <a:ext cx="2736327" cy="416845"/>
+                  </a:xfrm>
+                  <a:prstGeom prst="rect">
+                    <a:avLst/>
+                  </a:prstGeom>
+                  <a:noFill/>
+                </p:spPr>
+                <p:txBody>
+                  <a:bodyPr wrap="none" lIns="0" tIns="0" rIns="0" bIns="0" rtlCol="0">
+                    <a:spAutoFit/>
+                  </a:bodyPr>
+                  <a:lstStyle/>
+                  <a:p>
+                    <a:pPr/>
+                    <a14:m>
+                      <m:oMathPara xmlns:m="http://schemas.openxmlformats.org/officeDocument/2006/math">
+                        <m:oMathParaPr>
+                          <m:jc m:val="centerGroup"/>
+                        </m:oMathParaPr>
+                        <m:oMath xmlns:m="http://schemas.openxmlformats.org/officeDocument/2006/math">
+                          <m:d>
+                            <m:dPr>
+                              <m:ctrlPr>
+                                <a:rPr lang="en-US" altLang="zh-CN" sz="2400" b="0" i="1" smtClean="0">
+                                  <a:latin typeface="Cambria Math" panose="02040503050406030204" pitchFamily="18" charset="0"/>
+                                </a:rPr>
+                              </m:ctrlPr>
+                            </m:dPr>
+                            <m:e>
+                              <m:sSub>
+                                <m:sSubPr>
+                                  <m:ctrlPr>
+                                    <a:rPr lang="en-US" altLang="zh-CN" sz="2400" b="0" i="1" smtClean="0">
+                                      <a:latin typeface="Cambria Math" panose="02040503050406030204" pitchFamily="18" charset="0"/>
+                                    </a:rPr>
+                                  </m:ctrlPr>
+                                </m:sSubPr>
+                                <m:e>
+                                  <m:r>
+                                    <a:rPr lang="en-US" altLang="zh-CN" sz="2400" b="0" i="1" smtClean="0">
+                                      <a:latin typeface="Cambria Math" panose="02040503050406030204" pitchFamily="18" charset="0"/>
+                                    </a:rPr>
+                                    <m:t>𝑏</m:t>
+                                  </m:r>
+                                </m:e>
+                                <m:sub>
+                                  <m:r>
+                                    <a:rPr lang="en-US" altLang="zh-CN" sz="2400" b="0" i="1" smtClean="0">
+                                      <a:latin typeface="Cambria Math" panose="02040503050406030204" pitchFamily="18" charset="0"/>
+                                    </a:rPr>
+                                    <m:t>𝑢</m:t>
+                                  </m:r>
+                                </m:sub>
+                              </m:sSub>
+                              <m:r>
+                                <a:rPr lang="en-US" altLang="zh-CN" sz="2400" b="0" i="1" smtClean="0">
+                                  <a:latin typeface="Cambria Math" panose="02040503050406030204" pitchFamily="18" charset="0"/>
+                                </a:rPr>
+                                <m:t>−</m:t>
+                              </m:r>
+                              <m:sSub>
+                                <m:sSubPr>
+                                  <m:ctrlPr>
+                                    <a:rPr lang="en-US" altLang="zh-CN" sz="2400" i="1">
+                                      <a:latin typeface="Cambria Math" panose="02040503050406030204" pitchFamily="18" charset="0"/>
+                                    </a:rPr>
+                                  </m:ctrlPr>
+                                </m:sSubPr>
+                                <m:e>
+                                  <m:r>
+                                    <a:rPr lang="en-US" altLang="zh-CN" sz="2400" i="1">
+                                      <a:latin typeface="Cambria Math" panose="02040503050406030204" pitchFamily="18" charset="0"/>
+                                    </a:rPr>
+                                    <m:t>𝜆</m:t>
+                                  </m:r>
+                                </m:e>
+                                <m:sub>
+                                  <m:r>
+                                    <a:rPr lang="en-US" altLang="zh-CN" sz="2400" b="0" i="1" smtClean="0">
+                                      <a:latin typeface="Cambria Math" panose="02040503050406030204" pitchFamily="18" charset="0"/>
+                                    </a:rPr>
+                                    <m:t>𝑛</m:t>
+                                  </m:r>
+                                  <m:r>
+                                    <a:rPr lang="en-US" altLang="zh-CN" sz="2400" b="0" i="1" smtClean="0">
+                                      <a:latin typeface="Cambria Math" panose="02040503050406030204" pitchFamily="18" charset="0"/>
+                                    </a:rPr>
+                                    <m:t>,</m:t>
+                                  </m:r>
+                                  <m:r>
+                                    <a:rPr lang="en-US" altLang="zh-CN" sz="2400" i="1">
+                                      <a:latin typeface="Cambria Math" panose="02040503050406030204" pitchFamily="18" charset="0"/>
+                                    </a:rPr>
+                                    <m:t>𝑖</m:t>
+                                  </m:r>
+                                </m:sub>
+                              </m:sSub>
+                            </m:e>
+                          </m:d>
+                          <m:sSub>
+                            <m:sSubPr>
+                              <m:ctrlPr>
+                                <a:rPr lang="en-US" altLang="zh-CN" sz="2400" i="1">
+                                  <a:latin typeface="Cambria Math" panose="02040503050406030204" pitchFamily="18" charset="0"/>
+                                </a:rPr>
+                              </m:ctrlPr>
+                            </m:sSubPr>
+                            <m:e>
+                              <m:r>
+                                <a:rPr lang="en-US" altLang="zh-CN" sz="2400" i="1">
+                                  <a:latin typeface="Cambria Math" panose="02040503050406030204" pitchFamily="18" charset="0"/>
+                                </a:rPr>
+                                <m:t>𝜂</m:t>
+                              </m:r>
+                            </m:e>
+                            <m:sub>
+                              <m:r>
+                                <a:rPr lang="en-US" altLang="zh-CN" sz="2400" b="0" i="1" smtClean="0">
+                                  <a:latin typeface="Cambria Math" panose="02040503050406030204" pitchFamily="18" charset="0"/>
+                                </a:rPr>
+                                <m:t>𝑛</m:t>
+                              </m:r>
+                              <m:r>
+                                <a:rPr lang="en-US" altLang="zh-CN" sz="2400" b="0" i="1" smtClean="0">
+                                  <a:latin typeface="Cambria Math" panose="02040503050406030204" pitchFamily="18" charset="0"/>
+                                </a:rPr>
+                                <m:t>,</m:t>
+                              </m:r>
+                              <m:r>
+                                <a:rPr lang="en-US" altLang="zh-CN" sz="2400" i="1">
+                                  <a:latin typeface="Cambria Math" panose="02040503050406030204" pitchFamily="18" charset="0"/>
+                                </a:rPr>
+                                <m:t>𝑖</m:t>
+                              </m:r>
+                            </m:sub>
+                          </m:sSub>
+                          <m:r>
+                            <a:rPr lang="en-US" altLang="zh-CN" sz="2400" b="0" i="1" smtClean="0">
+                              <a:latin typeface="Cambria Math" panose="02040503050406030204" pitchFamily="18" charset="0"/>
+                            </a:rPr>
+                            <m:t>=−</m:t>
+                          </m:r>
+                          <m:r>
+                            <a:rPr lang="en-US" altLang="zh-CN" sz="2400" b="0" i="1" smtClean="0">
+                              <a:latin typeface="Cambria Math" panose="02040503050406030204" pitchFamily="18" charset="0"/>
+                            </a:rPr>
+                            <m:t>𝑠</m:t>
+                          </m:r>
+                        </m:oMath>
+                      </m:oMathPara>
+                    </a14:m>
+                    <a:endParaRPr lang="zh-CN" altLang="en-US" sz="2400" dirty="0"/>
+                  </a:p>
+                </p:txBody>
+              </p:sp>
+            </mc:Choice>
+            <mc:Fallback>
+              <p:sp>
+                <p:nvSpPr>
+                  <p:cNvPr id="16" name="TextBox 15">
+                    <a:extLst>
+                      <a:ext uri="{FF2B5EF4-FFF2-40B4-BE49-F238E27FC236}">
+                        <a16:creationId xmlns:a16="http://schemas.microsoft.com/office/drawing/2014/main" id="{A6B7F194-7833-4D6D-A221-06CF3598AC9D}"/>
+                      </a:ext>
+                    </a:extLst>
+                  </p:cNvPr>
+                  <p:cNvSpPr txBox="1">
+                    <a:spLocks noRot="1" noChangeAspect="1" noMove="1" noResize="1" noEditPoints="1" noAdjustHandles="1" noChangeArrowheads="1" noChangeShapeType="1" noTextEdit="1"/>
+                  </p:cNvSpPr>
+                  <p:nvPr/>
+                </p:nvSpPr>
+                <p:spPr>
+                  <a:xfrm>
+                    <a:off x="5732407" y="4579739"/>
+                    <a:ext cx="2736327" cy="416845"/>
+                  </a:xfrm>
+                  <a:prstGeom prst="rect">
+                    <a:avLst/>
+                  </a:prstGeom>
+                  <a:blipFill>
+                    <a:blip r:embed="rId6"/>
+                    <a:stretch>
+                      <a:fillRect/>
+                    </a:stretch>
+                  </a:blipFill>
+                </p:spPr>
+                <p:txBody>
+                  <a:bodyPr/>
+                  <a:lstStyle/>
+                  <a:p>
+                    <a:r>
+                      <a:rPr lang="zh-CN" altLang="en-US">
+                        <a:noFill/>
+                      </a:rPr>
+                      <a:t> </a:t>
+                    </a:r>
+                  </a:p>
+                </p:txBody>
+              </p:sp>
+            </mc:Fallback>
+          </mc:AlternateContent>
+          <p:cxnSp>
+            <p:nvCxnSpPr>
+              <p:cNvPr id="17" name="Straight Arrow Connector 16">
+                <a:extLst>
+                  <a:ext uri="{FF2B5EF4-FFF2-40B4-BE49-F238E27FC236}">
+                    <a16:creationId xmlns:a16="http://schemas.microsoft.com/office/drawing/2014/main" id="{2085D927-28F5-4AC7-85D1-8302DF12161C}"/>
+                  </a:ext>
+                </a:extLst>
+              </p:cNvPr>
+              <p:cNvCxnSpPr>
+                <a:cxnSpLocks/>
+              </p:cNvCxnSpPr>
+              <p:nvPr/>
+            </p:nvCxnSpPr>
+            <p:spPr>
+              <a:xfrm flipV="1">
+                <a:off x="7579023" y="3721766"/>
+                <a:ext cx="811314" cy="829559"/>
+              </a:xfrm>
+              <a:prstGeom prst="straightConnector1">
+                <a:avLst/>
+              </a:prstGeom>
+              <a:ln>
+                <a:tailEnd type="triangle"/>
+              </a:ln>
+            </p:spPr>
+            <p:style>
+              <a:lnRef idx="1">
+                <a:schemeClr val="dk1"/>
+              </a:lnRef>
+              <a:fillRef idx="0">
+                <a:schemeClr val="dk1"/>
+              </a:fillRef>
+              <a:effectRef idx="0">
+                <a:schemeClr val="dk1"/>
+              </a:effectRef>
+              <a:fontRef idx="minor">
+                <a:schemeClr val="tx1"/>
+              </a:fontRef>
+            </p:style>
+          </p:cxnSp>
+        </p:grpSp>
       </p:grpSp>
     </p:spTree>
     <p:extLst>

</xml_diff>